<commit_message>
Adding slides for tomorrow
</commit_message>
<xml_diff>
--- a/MF coordination/SI_game/RBA Coffee Monetary and Fiscal Policy Coordination.pptx
+++ b/MF coordination/SI_game/RBA Coffee Monetary and Fiscal Policy Coordination.pptx
@@ -5,38 +5,39 @@
     <p:sldMasterId id="2147483650" r:id="rId1"/>
   </p:sldMasterIdLst>
   <p:notesMasterIdLst>
-    <p:notesMasterId r:id="rId28"/>
+    <p:notesMasterId r:id="rId29"/>
   </p:notesMasterIdLst>
   <p:handoutMasterIdLst>
-    <p:handoutMasterId r:id="rId29"/>
+    <p:handoutMasterId r:id="rId30"/>
   </p:handoutMasterIdLst>
   <p:sldIdLst>
     <p:sldId id="256" r:id="rId2"/>
     <p:sldId id="302" r:id="rId3"/>
     <p:sldId id="283" r:id="rId4"/>
-    <p:sldId id="306" r:id="rId5"/>
-    <p:sldId id="282" r:id="rId6"/>
-    <p:sldId id="290" r:id="rId7"/>
-    <p:sldId id="307" r:id="rId8"/>
-    <p:sldId id="308" r:id="rId9"/>
-    <p:sldId id="309" r:id="rId10"/>
-    <p:sldId id="285" r:id="rId11"/>
-    <p:sldId id="287" r:id="rId12"/>
-    <p:sldId id="310" r:id="rId13"/>
-    <p:sldId id="291" r:id="rId14"/>
-    <p:sldId id="273" r:id="rId15"/>
-    <p:sldId id="276" r:id="rId16"/>
-    <p:sldId id="260" r:id="rId17"/>
-    <p:sldId id="300" r:id="rId18"/>
-    <p:sldId id="299" r:id="rId19"/>
-    <p:sldId id="301" r:id="rId20"/>
-    <p:sldId id="303" r:id="rId21"/>
-    <p:sldId id="305" r:id="rId22"/>
-    <p:sldId id="311" r:id="rId23"/>
-    <p:sldId id="270" r:id="rId24"/>
-    <p:sldId id="274" r:id="rId25"/>
-    <p:sldId id="275" r:id="rId26"/>
-    <p:sldId id="262" r:id="rId27"/>
+    <p:sldId id="312" r:id="rId5"/>
+    <p:sldId id="306" r:id="rId6"/>
+    <p:sldId id="282" r:id="rId7"/>
+    <p:sldId id="290" r:id="rId8"/>
+    <p:sldId id="307" r:id="rId9"/>
+    <p:sldId id="308" r:id="rId10"/>
+    <p:sldId id="309" r:id="rId11"/>
+    <p:sldId id="285" r:id="rId12"/>
+    <p:sldId id="287" r:id="rId13"/>
+    <p:sldId id="310" r:id="rId14"/>
+    <p:sldId id="291" r:id="rId15"/>
+    <p:sldId id="273" r:id="rId16"/>
+    <p:sldId id="276" r:id="rId17"/>
+    <p:sldId id="260" r:id="rId18"/>
+    <p:sldId id="300" r:id="rId19"/>
+    <p:sldId id="299" r:id="rId20"/>
+    <p:sldId id="301" r:id="rId21"/>
+    <p:sldId id="303" r:id="rId22"/>
+    <p:sldId id="305" r:id="rId23"/>
+    <p:sldId id="311" r:id="rId24"/>
+    <p:sldId id="270" r:id="rId25"/>
+    <p:sldId id="274" r:id="rId26"/>
+    <p:sldId id="275" r:id="rId27"/>
+    <p:sldId id="262" r:id="rId28"/>
   </p:sldIdLst>
   <p:sldSz cx="9144000" cy="5143500" type="screen16x9"/>
   <p:notesSz cx="6797675" cy="9928225"/>
@@ -2231,7 +2232,7 @@
             <a:fld id="{72E6E50C-42F6-44F9-849C-F9C68685802B}" type="datetimeFigureOut">
               <a:rPr lang="en-AU" smtClean="0"/>
               <a:pPr/>
-              <a:t>2/12/2024</a:t>
+              <a:t>5/12/2024</a:t>
             </a:fld>
             <a:endParaRPr lang="en-AU"/>
           </a:p>
@@ -2407,7 +2408,7 @@
             <a:fld id="{746BCAF0-30A3-4E26-855A-16D175EBDECD}" type="datetime1">
               <a:rPr lang="en-AU"/>
               <a:pPr/>
-              <a:t>2/12/2024</a:t>
+              <a:t>5/12/2024</a:t>
             </a:fld>
             <a:endParaRPr lang="en-AU"/>
           </a:p>
@@ -2811,7 +2812,13 @@
   <p:cSld>
     <p:spTree>
       <p:nvGrpSpPr>
-        <p:cNvPr id="1" name=""/>
+        <p:cNvPr id="1" name="">
+          <a:extLst>
+            <a:ext uri="{FF2B5EF4-FFF2-40B4-BE49-F238E27FC236}">
+              <a16:creationId xmlns:a16="http://schemas.microsoft.com/office/drawing/2014/main" id="{B48E2838-ED62-AB5F-EA86-BD364349DBA4}"/>
+            </a:ext>
+          </a:extLst>
+        </p:cNvPr>
         <p:cNvGrpSpPr/>
         <p:nvPr/>
       </p:nvGrpSpPr>
@@ -2825,7 +2832,13 @@
       </p:grpSpPr>
       <p:sp>
         <p:nvSpPr>
-          <p:cNvPr id="2" name="Slide Image Placeholder 1"/>
+          <p:cNvPr id="2" name="Slide Image Placeholder 1">
+            <a:extLst>
+              <a:ext uri="{FF2B5EF4-FFF2-40B4-BE49-F238E27FC236}">
+                <a16:creationId xmlns:a16="http://schemas.microsoft.com/office/drawing/2014/main" id="{14E0352C-AEFA-CEFF-50D5-A7925A902966}"/>
+              </a:ext>
+            </a:extLst>
+          </p:cNvPr>
           <p:cNvSpPr>
             <a:spLocks noGrp="1" noRot="1" noChangeAspect="1"/>
           </p:cNvSpPr>
@@ -2837,7 +2850,13 @@
       </p:sp>
       <p:sp>
         <p:nvSpPr>
-          <p:cNvPr id="3" name="Notes Placeholder 2"/>
+          <p:cNvPr id="3" name="Notes Placeholder 2">
+            <a:extLst>
+              <a:ext uri="{FF2B5EF4-FFF2-40B4-BE49-F238E27FC236}">
+                <a16:creationId xmlns:a16="http://schemas.microsoft.com/office/drawing/2014/main" id="{CA309A9C-EA6D-C3D9-95F7-E9A707731467}"/>
+              </a:ext>
+            </a:extLst>
+          </p:cNvPr>
           <p:cNvSpPr>
             <a:spLocks noGrp="1"/>
           </p:cNvSpPr>
@@ -2851,25 +2870,51 @@
           <a:lstStyle/>
           <a:p>
             <a:r>
-              <a:rPr lang="en-US" dirty="0"/>
-              <a:t>We only started this 2 weeks ago, so we have stuck with a very simple model to show the “tendencies” we believe a more complex macro-game theory model will involve.</a:t>
-            </a:r>
-          </a:p>
-          <a:p>
-            <a:endParaRPr lang="en-US" dirty="0"/>
-          </a:p>
-          <a:p>
-            <a:r>
-              <a:rPr lang="en-US" dirty="0"/>
-              <a:t>Example: dg is the sensitivity of inflation to tightness in fiscal policy.</a:t>
-            </a:r>
-            <a:endParaRPr lang="en-NZ" dirty="0"/>
-          </a:p>
-        </p:txBody>
-      </p:sp>
-      <p:sp>
-        <p:nvSpPr>
-          <p:cNvPr id="4" name="Slide Number Placeholder 3"/>
+              <a:rPr lang="en-AU" dirty="0"/>
+              <a:t>To sum up, our main contributions are:</a:t>
+            </a:r>
+          </a:p>
+          <a:p>
+            <a:endParaRPr lang="en-AU" dirty="0"/>
+          </a:p>
+          <a:p>
+            <a:pPr marL="228600" indent="-228600">
+              <a:buAutoNum type="arabicParenR"/>
+            </a:pPr>
+            <a:r>
+              <a:rPr lang="en-AU" dirty="0"/>
+              <a:t>A dynamic game theory model that allows for pre-commitment.</a:t>
+            </a:r>
+          </a:p>
+          <a:p>
+            <a:pPr marL="228600" indent="-228600">
+              <a:buAutoNum type="arabicParenR"/>
+            </a:pPr>
+            <a:r>
+              <a:rPr lang="en-AU" dirty="0"/>
+              <a:t>A discussion of how monetary fiscal conflict varies on the basis of supply vs demand shocks.</a:t>
+            </a:r>
+          </a:p>
+          <a:p>
+            <a:pPr marL="228600" indent="-228600">
+              <a:buAutoNum type="arabicParenR"/>
+            </a:pPr>
+            <a:r>
+              <a:rPr lang="en-AU" dirty="0"/>
+              <a:t>Endogenous determination of commitment regimes and their relation to social welfare.</a:t>
+            </a:r>
+          </a:p>
+        </p:txBody>
+      </p:sp>
+      <p:sp>
+        <p:nvSpPr>
+          <p:cNvPr id="4" name="Slide Number Placeholder 3">
+            <a:extLst>
+              <a:ext uri="{FF2B5EF4-FFF2-40B4-BE49-F238E27FC236}">
+                <a16:creationId xmlns:a16="http://schemas.microsoft.com/office/drawing/2014/main" id="{505DDC82-778A-08E9-1453-F98FAB7E9D13}"/>
+              </a:ext>
+            </a:extLst>
+          </p:cNvPr>
           <p:cNvSpPr>
             <a:spLocks noGrp="1"/>
           </p:cNvSpPr>
@@ -2894,7 +2939,7 @@
     </p:spTree>
     <p:extLst>
       <p:ext uri="{BB962C8B-B14F-4D97-AF65-F5344CB8AC3E}">
-        <p14:creationId xmlns:p14="http://schemas.microsoft.com/office/powerpoint/2010/main" val="1589114763"/>
+        <p14:creationId xmlns:p14="http://schemas.microsoft.com/office/powerpoint/2010/main" val="875647486"/>
       </p:ext>
     </p:extLst>
   </p:cSld>
@@ -2950,56 +2995,18 @@
           <a:p>
             <a:r>
               <a:rPr lang="en-US" dirty="0"/>
-              <a:t>Note: The social welfare function may be different again from these loss functions.  DL (2003) estimate a social welfare function when talking through their results, while </a:t>
-            </a:r>
-            <a:r>
-              <a:rPr lang="en-US" dirty="0" err="1"/>
-              <a:t>Coury</a:t>
-            </a:r>
+              <a:t>We only started this 2 weeks ago, so we have stuck with a very simple model to show the “tendencies” we believe a more complex macro-game theory model will involve.</a:t>
+            </a:r>
+          </a:p>
+          <a:p>
+            <a:endParaRPr lang="en-US" dirty="0"/>
+          </a:p>
+          <a:p>
             <a:r>
               <a:rPr lang="en-US" dirty="0"/>
-              <a:t> and </a:t>
-            </a:r>
-            <a:r>
-              <a:rPr lang="en-US" dirty="0" err="1"/>
-              <a:t>Petkov</a:t>
-            </a:r>
-            <a:r>
-              <a:rPr lang="en-US" dirty="0"/>
-              <a:t> (2010) have the fiscal authorities objective as the social welfare function, and are trying to deal with concerns about time commitment and the role of delegation. </a:t>
-            </a:r>
-          </a:p>
-          <a:p>
-            <a:r>
-              <a:rPr lang="en-US" dirty="0"/>
-              <a:t>The idea is as follows.  The social planner wants to </a:t>
-            </a:r>
-            <a:r>
-              <a:rPr lang="en-US" dirty="0" err="1"/>
-              <a:t>maximise</a:t>
-            </a:r>
-            <a:r>
-              <a:rPr lang="en-US" dirty="0"/>
-              <a:t> social welfare. However, it sets things up such that each authority – fiscal or monetary – only chooses a single objective and is responsible for it with its single target.  In this case, we will set Mg to 0 and Mm to 1 so that government only thinks about output and the monetary authority only thinks about inflation.</a:t>
-            </a:r>
-          </a:p>
-          <a:p>
-            <a:endParaRPr lang="en-US" dirty="0"/>
-          </a:p>
-          <a:p>
-            <a:r>
-              <a:rPr lang="en-US" dirty="0"/>
-              <a:t>In this case, we may have a social planner that values both output deviations and inflation deviations equally, and they have split these responsibilities because they expect the authorities to achieve this end. In fact, if the two “cooperate” they will behave in this way.</a:t>
-            </a:r>
-          </a:p>
-          <a:p>
-            <a:endParaRPr lang="en-US" dirty="0"/>
-          </a:p>
-          <a:p>
-            <a:r>
-              <a:rPr lang="en-US" dirty="0"/>
-              <a:t>The only complication is how we view the “adjustment” cost. If that is part of social welfare then we can view the cooperative outcome as equivalent to the welfare maximizing outcome.  If instead it is a psychic cost on the institution alone, and not part of social welfare, these will be different.</a:t>
-            </a:r>
+              <a:t>Example: dg is the sensitivity of inflation to tightness in fiscal policy.</a:t>
+            </a:r>
+            <a:endParaRPr lang="en-NZ" dirty="0"/>
           </a:p>
         </p:txBody>
       </p:sp>
@@ -3022,6 +3029,142 @@
               <a:rPr lang="en-AU" smtClean="0"/>
               <a:pPr/>
               <a:t>11</a:t>
+            </a:fld>
+            <a:endParaRPr lang="en-AU"/>
+          </a:p>
+        </p:txBody>
+      </p:sp>
+    </p:spTree>
+    <p:extLst>
+      <p:ext uri="{BB962C8B-B14F-4D97-AF65-F5344CB8AC3E}">
+        <p14:creationId xmlns:p14="http://schemas.microsoft.com/office/powerpoint/2010/main" val="1589114763"/>
+      </p:ext>
+    </p:extLst>
+  </p:cSld>
+  <p:clrMapOvr>
+    <a:masterClrMapping/>
+  </p:clrMapOvr>
+</p:notes>
+</file>
+
+<file path=ppt/notesSlides/notesSlide12.xml><?xml version="1.0" encoding="utf-8"?>
+<p:notes xmlns:a="http://schemas.openxmlformats.org/drawingml/2006/main" xmlns:r="http://schemas.openxmlformats.org/officeDocument/2006/relationships" xmlns:p="http://schemas.openxmlformats.org/presentationml/2006/main">
+  <p:cSld>
+    <p:spTree>
+      <p:nvGrpSpPr>
+        <p:cNvPr id="1" name=""/>
+        <p:cNvGrpSpPr/>
+        <p:nvPr/>
+      </p:nvGrpSpPr>
+      <p:grpSpPr>
+        <a:xfrm>
+          <a:off x="0" y="0"/>
+          <a:ext cx="0" cy="0"/>
+          <a:chOff x="0" y="0"/>
+          <a:chExt cx="0" cy="0"/>
+        </a:xfrm>
+      </p:grpSpPr>
+      <p:sp>
+        <p:nvSpPr>
+          <p:cNvPr id="2" name="Slide Image Placeholder 1"/>
+          <p:cNvSpPr>
+            <a:spLocks noGrp="1" noRot="1" noChangeAspect="1"/>
+          </p:cNvSpPr>
+          <p:nvPr>
+            <p:ph type="sldImg"/>
+          </p:nvPr>
+        </p:nvSpPr>
+        <p:spPr/>
+      </p:sp>
+      <p:sp>
+        <p:nvSpPr>
+          <p:cNvPr id="3" name="Notes Placeholder 2"/>
+          <p:cNvSpPr>
+            <a:spLocks noGrp="1"/>
+          </p:cNvSpPr>
+          <p:nvPr>
+            <p:ph type="body" idx="1"/>
+          </p:nvPr>
+        </p:nvSpPr>
+        <p:spPr/>
+        <p:txBody>
+          <a:bodyPr/>
+          <a:lstStyle/>
+          <a:p>
+            <a:r>
+              <a:rPr lang="en-US" dirty="0"/>
+              <a:t>Note: The social welfare function may be different again from these loss functions.  DL (2003) estimate a social welfare function when talking through their results, while </a:t>
+            </a:r>
+            <a:r>
+              <a:rPr lang="en-US" dirty="0" err="1"/>
+              <a:t>Coury</a:t>
+            </a:r>
+            <a:r>
+              <a:rPr lang="en-US" dirty="0"/>
+              <a:t> and </a:t>
+            </a:r>
+            <a:r>
+              <a:rPr lang="en-US" dirty="0" err="1"/>
+              <a:t>Petkov</a:t>
+            </a:r>
+            <a:r>
+              <a:rPr lang="en-US" dirty="0"/>
+              <a:t> (2010) have the fiscal authorities objective as the social welfare function, and are trying to deal with concerns about time commitment and the role of delegation. </a:t>
+            </a:r>
+          </a:p>
+          <a:p>
+            <a:r>
+              <a:rPr lang="en-US" dirty="0"/>
+              <a:t>The idea is as follows.  The social planner wants to </a:t>
+            </a:r>
+            <a:r>
+              <a:rPr lang="en-US" dirty="0" err="1"/>
+              <a:t>maximise</a:t>
+            </a:r>
+            <a:r>
+              <a:rPr lang="en-US" dirty="0"/>
+              <a:t> social welfare. However, it sets things up such that each authority – fiscal or monetary – only chooses a single objective and is responsible for it with its single target.  In this case, we will set Mg to 0 and Mm to 1 so that government only thinks about output and the monetary authority only thinks about inflation.</a:t>
+            </a:r>
+          </a:p>
+          <a:p>
+            <a:endParaRPr lang="en-US" dirty="0"/>
+          </a:p>
+          <a:p>
+            <a:r>
+              <a:rPr lang="en-US" dirty="0"/>
+              <a:t>In this case, we may have a social planner that values both output deviations and inflation deviations equally, and they have split these responsibilities because they expect the authorities to achieve this end. In fact, if the two “cooperate” they will behave in this way.</a:t>
+            </a:r>
+          </a:p>
+          <a:p>
+            <a:endParaRPr lang="en-US" dirty="0"/>
+          </a:p>
+          <a:p>
+            <a:r>
+              <a:rPr lang="en-US" dirty="0"/>
+              <a:t>The only complication is how we view the “adjustment” cost. If that is part of social welfare then we can view the cooperative outcome as equivalent to the welfare maximizing outcome.  If instead it is a psychic cost on the institution alone, and not part of social welfare, these will be different.</a:t>
+            </a:r>
+          </a:p>
+        </p:txBody>
+      </p:sp>
+      <p:sp>
+        <p:nvSpPr>
+          <p:cNvPr id="4" name="Slide Number Placeholder 3"/>
+          <p:cNvSpPr>
+            <a:spLocks noGrp="1"/>
+          </p:cNvSpPr>
+          <p:nvPr>
+            <p:ph type="sldNum" sz="quarter" idx="5"/>
+          </p:nvPr>
+        </p:nvSpPr>
+        <p:spPr/>
+        <p:txBody>
+          <a:bodyPr/>
+          <a:lstStyle/>
+          <a:p>
+            <a:fld id="{22FC436C-5653-4517-9B94-0BB68ACE2454}" type="slidenum">
+              <a:rPr lang="en-AU" smtClean="0"/>
+              <a:pPr/>
+              <a:t>12</a:t>
             </a:fld>
             <a:endParaRPr lang="en-AU"/>
           </a:p>
@@ -3040,7 +3183,7 @@
 </p:notes>
 </file>
 
-<file path=ppt/notesSlides/notesSlide12.xml><?xml version="1.0" encoding="utf-8"?>
+<file path=ppt/notesSlides/notesSlide13.xml><?xml version="1.0" encoding="utf-8"?>
 <p:notes xmlns:a="http://schemas.openxmlformats.org/drawingml/2006/main" xmlns:r="http://schemas.openxmlformats.org/officeDocument/2006/relationships" xmlns:p="http://schemas.openxmlformats.org/presentationml/2006/main">
   <p:cSld>
     <p:spTree>
@@ -3130,7 +3273,7 @@
             <a:fld id="{22FC436C-5653-4517-9B94-0BB68ACE2454}" type="slidenum">
               <a:rPr lang="en-AU" smtClean="0"/>
               <a:pPr/>
-              <a:t>12</a:t>
+              <a:t>13</a:t>
             </a:fld>
             <a:endParaRPr lang="en-AU"/>
           </a:p>
@@ -3140,103 +3283,6 @@
     <p:extLst>
       <p:ext uri="{BB962C8B-B14F-4D97-AF65-F5344CB8AC3E}">
         <p14:creationId xmlns:p14="http://schemas.microsoft.com/office/powerpoint/2010/main" val="3327195245"/>
-      </p:ext>
-    </p:extLst>
-  </p:cSld>
-  <p:clrMapOvr>
-    <a:masterClrMapping/>
-  </p:clrMapOvr>
-</p:notes>
-</file>
-
-<file path=ppt/notesSlides/notesSlide13.xml><?xml version="1.0" encoding="utf-8"?>
-<p:notes xmlns:a="http://schemas.openxmlformats.org/drawingml/2006/main" xmlns:r="http://schemas.openxmlformats.org/officeDocument/2006/relationships" xmlns:p="http://schemas.openxmlformats.org/presentationml/2006/main">
-  <p:cSld>
-    <p:spTree>
-      <p:nvGrpSpPr>
-        <p:cNvPr id="1" name=""/>
-        <p:cNvGrpSpPr/>
-        <p:nvPr/>
-      </p:nvGrpSpPr>
-      <p:grpSpPr>
-        <a:xfrm>
-          <a:off x="0" y="0"/>
-          <a:ext cx="0" cy="0"/>
-          <a:chOff x="0" y="0"/>
-          <a:chExt cx="0" cy="0"/>
-        </a:xfrm>
-      </p:grpSpPr>
-      <p:sp>
-        <p:nvSpPr>
-          <p:cNvPr id="2" name="Slide Image Placeholder 1"/>
-          <p:cNvSpPr>
-            <a:spLocks noGrp="1" noRot="1" noChangeAspect="1"/>
-          </p:cNvSpPr>
-          <p:nvPr>
-            <p:ph type="sldImg"/>
-          </p:nvPr>
-        </p:nvSpPr>
-        <p:spPr/>
-      </p:sp>
-      <p:sp>
-        <p:nvSpPr>
-          <p:cNvPr id="3" name="Notes Placeholder 2"/>
-          <p:cNvSpPr>
-            <a:spLocks noGrp="1"/>
-          </p:cNvSpPr>
-          <p:nvPr>
-            <p:ph type="body" idx="1"/>
-          </p:nvPr>
-        </p:nvSpPr>
-        <p:spPr/>
-        <p:txBody>
-          <a:bodyPr/>
-          <a:lstStyle/>
-          <a:p>
-            <a:r>
-              <a:rPr lang="en-AU" dirty="0"/>
-              <a:t>Necessary to make responding to a shock costly, otherwise there is no Nash Equilibrium in this game.  We can view this as a form of “conservativeness” in behaviour, and in a more general macro-model this term won’t be necessary.</a:t>
-            </a:r>
-          </a:p>
-          <a:p>
-            <a:endParaRPr lang="en-AU" dirty="0"/>
-          </a:p>
-          <a:p>
-            <a:r>
-              <a:rPr lang="en-AU" dirty="0"/>
-              <a:t>When both instruments are set to zero, both inflation and output are below their target levels, which is why this is a “demand shock”.  We can imagine the game “started” with gamma and alpha at 2, and optimal policy at f = m = 0.</a:t>
-            </a:r>
-          </a:p>
-        </p:txBody>
-      </p:sp>
-      <p:sp>
-        <p:nvSpPr>
-          <p:cNvPr id="4" name="Slide Number Placeholder 3"/>
-          <p:cNvSpPr>
-            <a:spLocks noGrp="1"/>
-          </p:cNvSpPr>
-          <p:nvPr>
-            <p:ph type="sldNum" sz="quarter" idx="5"/>
-          </p:nvPr>
-        </p:nvSpPr>
-        <p:spPr/>
-        <p:txBody>
-          <a:bodyPr/>
-          <a:lstStyle/>
-          <a:p>
-            <a:fld id="{22FC436C-5653-4517-9B94-0BB68ACE2454}" type="slidenum">
-              <a:rPr lang="en-AU" smtClean="0"/>
-              <a:pPr/>
-              <a:t>13</a:t>
-            </a:fld>
-            <a:endParaRPr lang="en-AU"/>
-          </a:p>
-        </p:txBody>
-      </p:sp>
-    </p:spTree>
-    <p:extLst>
-      <p:ext uri="{BB962C8B-B14F-4D97-AF65-F5344CB8AC3E}">
-        <p14:creationId xmlns:p14="http://schemas.microsoft.com/office/powerpoint/2010/main" val="3856256237"/>
       </p:ext>
     </p:extLst>
   </p:cSld>
@@ -3291,60 +3337,18 @@
           <a:lstStyle/>
           <a:p>
             <a:r>
-              <a:rPr lang="en-US" dirty="0"/>
-              <a:t>Demand shock:</a:t>
-            </a:r>
-          </a:p>
-          <a:p>
-            <a:endParaRPr lang="en-US" dirty="0"/>
-          </a:p>
-          <a:p>
-            <a:pPr marL="228600" indent="-228600">
-              <a:buAutoNum type="arabicParenR"/>
-            </a:pPr>
-            <a:r>
-              <a:rPr lang="en-US" dirty="0"/>
-              <a:t>NE leads to less easing by both authorities after a demand shock.</a:t>
-            </a:r>
-          </a:p>
-          <a:p>
-            <a:pPr marL="228600" indent="-228600">
-              <a:buAutoNum type="arabicParenR"/>
-            </a:pPr>
-            <a:endParaRPr lang="en-US" dirty="0"/>
-          </a:p>
-          <a:p>
-            <a:pPr marL="228600" indent="-228600">
-              <a:buAutoNum type="arabicParenR"/>
-            </a:pPr>
-            <a:r>
-              <a:rPr lang="en-US" dirty="0"/>
-              <a:t>“Pre-commitment” or “leadership” generates worse outcomes – unlike the other literature (i.e. </a:t>
-            </a:r>
-            <a:r>
-              <a:rPr lang="en-US" dirty="0" err="1"/>
-              <a:t>Debelle</a:t>
-            </a:r>
-            <a:r>
-              <a:rPr lang="en-US" dirty="0"/>
-              <a:t> and Fischer 1994).  Why? Cost of policy adjustment generates a free-rider problem which gets worse with pre-commitment.</a:t>
-            </a:r>
-          </a:p>
-          <a:p>
-            <a:pPr marL="228600" indent="-228600">
-              <a:buAutoNum type="arabicParenR"/>
-            </a:pPr>
-            <a:endParaRPr lang="en-US" dirty="0"/>
-          </a:p>
-          <a:p>
-            <a:pPr marL="228600" indent="-228600">
-              <a:buAutoNum type="arabicParenR"/>
-            </a:pPr>
-            <a:r>
-              <a:rPr lang="en-US" dirty="0"/>
-              <a:t>The idea here is that equilibrium play leads to “conservative” play by both fiscal and monetary authorities.</a:t>
-            </a:r>
-            <a:endParaRPr lang="en-NZ" dirty="0"/>
+              <a:rPr lang="en-AU" dirty="0"/>
+              <a:t>Necessary to make responding to a shock costly, otherwise there is no Nash Equilibrium in this game.  We can view this as a form of “conservativeness” in behaviour, and in a more general macro-model this term won’t be necessary.</a:t>
+            </a:r>
+          </a:p>
+          <a:p>
+            <a:endParaRPr lang="en-AU" dirty="0"/>
+          </a:p>
+          <a:p>
+            <a:r>
+              <a:rPr lang="en-AU" dirty="0"/>
+              <a:t>When both instruments are set to zero, both inflation and output are below their target levels, which is why this is a “demand shock”.  We can imagine the game “started” with gamma and alpha at 2, and optimal policy at f = m = 0.</a:t>
+            </a:r>
           </a:p>
         </p:txBody>
       </p:sp>
@@ -3375,7 +3379,7 @@
     </p:spTree>
     <p:extLst>
       <p:ext uri="{BB962C8B-B14F-4D97-AF65-F5344CB8AC3E}">
-        <p14:creationId xmlns:p14="http://schemas.microsoft.com/office/powerpoint/2010/main" val="64880493"/>
+        <p14:creationId xmlns:p14="http://schemas.microsoft.com/office/powerpoint/2010/main" val="3856256237"/>
       </p:ext>
     </p:extLst>
   </p:cSld>
@@ -3429,6 +3433,60 @@
           <a:bodyPr/>
           <a:lstStyle/>
           <a:p>
+            <a:r>
+              <a:rPr lang="en-US" dirty="0"/>
+              <a:t>Demand shock:</a:t>
+            </a:r>
+          </a:p>
+          <a:p>
+            <a:endParaRPr lang="en-US" dirty="0"/>
+          </a:p>
+          <a:p>
+            <a:pPr marL="228600" indent="-228600">
+              <a:buAutoNum type="arabicParenR"/>
+            </a:pPr>
+            <a:r>
+              <a:rPr lang="en-US" dirty="0"/>
+              <a:t>NE leads to less easing by both authorities after a demand shock.</a:t>
+            </a:r>
+          </a:p>
+          <a:p>
+            <a:pPr marL="228600" indent="-228600">
+              <a:buAutoNum type="arabicParenR"/>
+            </a:pPr>
+            <a:endParaRPr lang="en-US" dirty="0"/>
+          </a:p>
+          <a:p>
+            <a:pPr marL="228600" indent="-228600">
+              <a:buAutoNum type="arabicParenR"/>
+            </a:pPr>
+            <a:r>
+              <a:rPr lang="en-US" dirty="0"/>
+              <a:t>“Pre-commitment” or “leadership” generates worse outcomes – unlike the other literature (i.e. </a:t>
+            </a:r>
+            <a:r>
+              <a:rPr lang="en-US" dirty="0" err="1"/>
+              <a:t>Debelle</a:t>
+            </a:r>
+            <a:r>
+              <a:rPr lang="en-US" dirty="0"/>
+              <a:t> and Fischer 1994).  Why? Cost of policy adjustment generates a free-rider problem which gets worse with pre-commitment.</a:t>
+            </a:r>
+          </a:p>
+          <a:p>
+            <a:pPr marL="228600" indent="-228600">
+              <a:buAutoNum type="arabicParenR"/>
+            </a:pPr>
+            <a:endParaRPr lang="en-US" dirty="0"/>
+          </a:p>
+          <a:p>
+            <a:pPr marL="228600" indent="-228600">
+              <a:buAutoNum type="arabicParenR"/>
+            </a:pPr>
+            <a:r>
+              <a:rPr lang="en-US" dirty="0"/>
+              <a:t>The idea here is that equilibrium play leads to “conservative” play by both fiscal and monetary authorities.</a:t>
+            </a:r>
             <a:endParaRPr lang="en-NZ" dirty="0"/>
           </a:p>
         </p:txBody>
@@ -3460,7 +3518,7 @@
     </p:spTree>
     <p:extLst>
       <p:ext uri="{BB962C8B-B14F-4D97-AF65-F5344CB8AC3E}">
-        <p14:creationId xmlns:p14="http://schemas.microsoft.com/office/powerpoint/2010/main" val="3866847914"/>
+        <p14:creationId xmlns:p14="http://schemas.microsoft.com/office/powerpoint/2010/main" val="64880493"/>
       </p:ext>
     </p:extLst>
   </p:cSld>
@@ -3514,6 +3572,91 @@
           <a:bodyPr/>
           <a:lstStyle/>
           <a:p>
+            <a:endParaRPr lang="en-NZ" dirty="0"/>
+          </a:p>
+        </p:txBody>
+      </p:sp>
+      <p:sp>
+        <p:nvSpPr>
+          <p:cNvPr id="4" name="Slide Number Placeholder 3"/>
+          <p:cNvSpPr>
+            <a:spLocks noGrp="1"/>
+          </p:cNvSpPr>
+          <p:nvPr>
+            <p:ph type="sldNum" sz="quarter" idx="5"/>
+          </p:nvPr>
+        </p:nvSpPr>
+        <p:spPr/>
+        <p:txBody>
+          <a:bodyPr/>
+          <a:lstStyle/>
+          <a:p>
+            <a:fld id="{22FC436C-5653-4517-9B94-0BB68ACE2454}" type="slidenum">
+              <a:rPr lang="en-AU" smtClean="0"/>
+              <a:pPr/>
+              <a:t>16</a:t>
+            </a:fld>
+            <a:endParaRPr lang="en-AU"/>
+          </a:p>
+        </p:txBody>
+      </p:sp>
+    </p:spTree>
+    <p:extLst>
+      <p:ext uri="{BB962C8B-B14F-4D97-AF65-F5344CB8AC3E}">
+        <p14:creationId xmlns:p14="http://schemas.microsoft.com/office/powerpoint/2010/main" val="3866847914"/>
+      </p:ext>
+    </p:extLst>
+  </p:cSld>
+  <p:clrMapOvr>
+    <a:masterClrMapping/>
+  </p:clrMapOvr>
+</p:notes>
+</file>
+
+<file path=ppt/notesSlides/notesSlide17.xml><?xml version="1.0" encoding="utf-8"?>
+<p:notes xmlns:a="http://schemas.openxmlformats.org/drawingml/2006/main" xmlns:r="http://schemas.openxmlformats.org/officeDocument/2006/relationships" xmlns:p="http://schemas.openxmlformats.org/presentationml/2006/main">
+  <p:cSld>
+    <p:spTree>
+      <p:nvGrpSpPr>
+        <p:cNvPr id="1" name=""/>
+        <p:cNvGrpSpPr/>
+        <p:nvPr/>
+      </p:nvGrpSpPr>
+      <p:grpSpPr>
+        <a:xfrm>
+          <a:off x="0" y="0"/>
+          <a:ext cx="0" cy="0"/>
+          <a:chOff x="0" y="0"/>
+          <a:chExt cx="0" cy="0"/>
+        </a:xfrm>
+      </p:grpSpPr>
+      <p:sp>
+        <p:nvSpPr>
+          <p:cNvPr id="2" name="Slide Image Placeholder 1"/>
+          <p:cNvSpPr>
+            <a:spLocks noGrp="1" noRot="1" noChangeAspect="1"/>
+          </p:cNvSpPr>
+          <p:nvPr>
+            <p:ph type="sldImg"/>
+          </p:nvPr>
+        </p:nvSpPr>
+        <p:spPr/>
+      </p:sp>
+      <p:sp>
+        <p:nvSpPr>
+          <p:cNvPr id="3" name="Notes Placeholder 2"/>
+          <p:cNvSpPr>
+            <a:spLocks noGrp="1"/>
+          </p:cNvSpPr>
+          <p:nvPr>
+            <p:ph type="body" idx="1"/>
+          </p:nvPr>
+        </p:nvSpPr>
+        <p:spPr/>
+        <p:txBody>
+          <a:bodyPr/>
+          <a:lstStyle/>
+          <a:p>
             <a:r>
               <a:rPr lang="en-AU" dirty="0"/>
               <a:t>What is the logic – a Stackelberg model does not mean that one player moves first.  It means that the other player KNOWS what that players choice will be.  There is an infinite cost for the player from changing from the choice the other player anticipates.  </a:t>
@@ -3575,7 +3718,7 @@
             <a:fld id="{22FC436C-5653-4517-9B94-0BB68ACE2454}" type="slidenum">
               <a:rPr lang="en-AU" smtClean="0"/>
               <a:pPr/>
-              <a:t>16</a:t>
+              <a:t>17</a:t>
             </a:fld>
             <a:endParaRPr lang="en-AU"/>
           </a:p>
@@ -3594,7 +3737,7 @@
 </p:notes>
 </file>
 
-<file path=ppt/notesSlides/notesSlide17.xml><?xml version="1.0" encoding="utf-8"?>
+<file path=ppt/notesSlides/notesSlide18.xml><?xml version="1.0" encoding="utf-8"?>
 <p:notes xmlns:a="http://schemas.openxmlformats.org/drawingml/2006/main" xmlns:r="http://schemas.openxmlformats.org/officeDocument/2006/relationships" xmlns:p="http://schemas.openxmlformats.org/presentationml/2006/main">
   <p:cSld>
     <p:spTree>
@@ -3715,7 +3858,7 @@
             <a:fld id="{22FC436C-5653-4517-9B94-0BB68ACE2454}" type="slidenum">
               <a:rPr lang="en-AU" smtClean="0"/>
               <a:pPr/>
-              <a:t>17</a:t>
+              <a:t>18</a:t>
             </a:fld>
             <a:endParaRPr lang="en-AU"/>
           </a:p>
@@ -3734,7 +3877,7 @@
 </p:notes>
 </file>
 
-<file path=ppt/notesSlides/notesSlide18.xml><?xml version="1.0" encoding="utf-8"?>
+<file path=ppt/notesSlides/notesSlide19.xml><?xml version="1.0" encoding="utf-8"?>
 <p:notes xmlns:a="http://schemas.openxmlformats.org/drawingml/2006/main" xmlns:r="http://schemas.openxmlformats.org/officeDocument/2006/relationships" xmlns:p="http://schemas.openxmlformats.org/presentationml/2006/main">
   <p:cSld>
     <p:spTree>
@@ -3828,7 +3971,7 @@
             <a:fld id="{22FC436C-5653-4517-9B94-0BB68ACE2454}" type="slidenum">
               <a:rPr lang="en-AU" smtClean="0"/>
               <a:pPr/>
-              <a:t>18</a:t>
+              <a:t>19</a:t>
             </a:fld>
             <a:endParaRPr lang="en-AU"/>
           </a:p>
@@ -3838,119 +3981,6 @@
     <p:extLst>
       <p:ext uri="{BB962C8B-B14F-4D97-AF65-F5344CB8AC3E}">
         <p14:creationId xmlns:p14="http://schemas.microsoft.com/office/powerpoint/2010/main" val="4179515843"/>
-      </p:ext>
-    </p:extLst>
-  </p:cSld>
-  <p:clrMapOvr>
-    <a:masterClrMapping/>
-  </p:clrMapOvr>
-</p:notes>
-</file>
-
-<file path=ppt/notesSlides/notesSlide19.xml><?xml version="1.0" encoding="utf-8"?>
-<p:notes xmlns:a="http://schemas.openxmlformats.org/drawingml/2006/main" xmlns:r="http://schemas.openxmlformats.org/officeDocument/2006/relationships" xmlns:p="http://schemas.openxmlformats.org/presentationml/2006/main">
-  <p:cSld>
-    <p:spTree>
-      <p:nvGrpSpPr>
-        <p:cNvPr id="1" name="">
-          <a:extLst>
-            <a:ext uri="{FF2B5EF4-FFF2-40B4-BE49-F238E27FC236}">
-              <a16:creationId xmlns:a16="http://schemas.microsoft.com/office/drawing/2014/main" id="{AC8B5306-AA10-69EB-948A-F66D553645A3}"/>
-            </a:ext>
-          </a:extLst>
-        </p:cNvPr>
-        <p:cNvGrpSpPr/>
-        <p:nvPr/>
-      </p:nvGrpSpPr>
-      <p:grpSpPr>
-        <a:xfrm>
-          <a:off x="0" y="0"/>
-          <a:ext cx="0" cy="0"/>
-          <a:chOff x="0" y="0"/>
-          <a:chExt cx="0" cy="0"/>
-        </a:xfrm>
-      </p:grpSpPr>
-      <p:sp>
-        <p:nvSpPr>
-          <p:cNvPr id="2" name="Slide Image Placeholder 1">
-            <a:extLst>
-              <a:ext uri="{FF2B5EF4-FFF2-40B4-BE49-F238E27FC236}">
-                <a16:creationId xmlns:a16="http://schemas.microsoft.com/office/drawing/2014/main" id="{50973E23-7942-F7FE-A5B8-19906469C0C6}"/>
-              </a:ext>
-            </a:extLst>
-          </p:cNvPr>
-          <p:cNvSpPr>
-            <a:spLocks noGrp="1" noRot="1" noChangeAspect="1"/>
-          </p:cNvSpPr>
-          <p:nvPr>
-            <p:ph type="sldImg"/>
-          </p:nvPr>
-        </p:nvSpPr>
-        <p:spPr/>
-      </p:sp>
-      <p:sp>
-        <p:nvSpPr>
-          <p:cNvPr id="3" name="Notes Placeholder 2">
-            <a:extLst>
-              <a:ext uri="{FF2B5EF4-FFF2-40B4-BE49-F238E27FC236}">
-                <a16:creationId xmlns:a16="http://schemas.microsoft.com/office/drawing/2014/main" id="{E09063E8-6505-268B-A18F-CF76325B97A1}"/>
-              </a:ext>
-            </a:extLst>
-          </p:cNvPr>
-          <p:cNvSpPr>
-            <a:spLocks noGrp="1"/>
-          </p:cNvSpPr>
-          <p:nvPr>
-            <p:ph type="body" idx="1"/>
-          </p:nvPr>
-        </p:nvSpPr>
-        <p:spPr/>
-        <p:txBody>
-          <a:bodyPr/>
-          <a:lstStyle/>
-          <a:p>
-            <a:r>
-              <a:rPr lang="en-US" dirty="0"/>
-              <a:t>XXX</a:t>
-            </a:r>
-            <a:endParaRPr lang="en-NZ" dirty="0"/>
-          </a:p>
-        </p:txBody>
-      </p:sp>
-      <p:sp>
-        <p:nvSpPr>
-          <p:cNvPr id="4" name="Slide Number Placeholder 3">
-            <a:extLst>
-              <a:ext uri="{FF2B5EF4-FFF2-40B4-BE49-F238E27FC236}">
-                <a16:creationId xmlns:a16="http://schemas.microsoft.com/office/drawing/2014/main" id="{22BB2D68-4417-E2FF-6872-B04B454C59C1}"/>
-              </a:ext>
-            </a:extLst>
-          </p:cNvPr>
-          <p:cNvSpPr>
-            <a:spLocks noGrp="1"/>
-          </p:cNvSpPr>
-          <p:nvPr>
-            <p:ph type="sldNum" sz="quarter" idx="5"/>
-          </p:nvPr>
-        </p:nvSpPr>
-        <p:spPr/>
-        <p:txBody>
-          <a:bodyPr/>
-          <a:lstStyle/>
-          <a:p>
-            <a:fld id="{22FC436C-5653-4517-9B94-0BB68ACE2454}" type="slidenum">
-              <a:rPr lang="en-AU" smtClean="0"/>
-              <a:pPr/>
-              <a:t>19</a:t>
-            </a:fld>
-            <a:endParaRPr lang="en-AU"/>
-          </a:p>
-        </p:txBody>
-      </p:sp>
-    </p:spTree>
-    <p:extLst>
-      <p:ext uri="{BB962C8B-B14F-4D97-AF65-F5344CB8AC3E}">
-        <p14:creationId xmlns:p14="http://schemas.microsoft.com/office/powerpoint/2010/main" val="1508711771"/>
       </p:ext>
     </p:extLst>
   </p:cSld>
@@ -4098,6 +4128,119 @@
         <p:cNvPr id="1" name="">
           <a:extLst>
             <a:ext uri="{FF2B5EF4-FFF2-40B4-BE49-F238E27FC236}">
+              <a16:creationId xmlns:a16="http://schemas.microsoft.com/office/drawing/2014/main" id="{AC8B5306-AA10-69EB-948A-F66D553645A3}"/>
+            </a:ext>
+          </a:extLst>
+        </p:cNvPr>
+        <p:cNvGrpSpPr/>
+        <p:nvPr/>
+      </p:nvGrpSpPr>
+      <p:grpSpPr>
+        <a:xfrm>
+          <a:off x="0" y="0"/>
+          <a:ext cx="0" cy="0"/>
+          <a:chOff x="0" y="0"/>
+          <a:chExt cx="0" cy="0"/>
+        </a:xfrm>
+      </p:grpSpPr>
+      <p:sp>
+        <p:nvSpPr>
+          <p:cNvPr id="2" name="Slide Image Placeholder 1">
+            <a:extLst>
+              <a:ext uri="{FF2B5EF4-FFF2-40B4-BE49-F238E27FC236}">
+                <a16:creationId xmlns:a16="http://schemas.microsoft.com/office/drawing/2014/main" id="{50973E23-7942-F7FE-A5B8-19906469C0C6}"/>
+              </a:ext>
+            </a:extLst>
+          </p:cNvPr>
+          <p:cNvSpPr>
+            <a:spLocks noGrp="1" noRot="1" noChangeAspect="1"/>
+          </p:cNvSpPr>
+          <p:nvPr>
+            <p:ph type="sldImg"/>
+          </p:nvPr>
+        </p:nvSpPr>
+        <p:spPr/>
+      </p:sp>
+      <p:sp>
+        <p:nvSpPr>
+          <p:cNvPr id="3" name="Notes Placeholder 2">
+            <a:extLst>
+              <a:ext uri="{FF2B5EF4-FFF2-40B4-BE49-F238E27FC236}">
+                <a16:creationId xmlns:a16="http://schemas.microsoft.com/office/drawing/2014/main" id="{E09063E8-6505-268B-A18F-CF76325B97A1}"/>
+              </a:ext>
+            </a:extLst>
+          </p:cNvPr>
+          <p:cNvSpPr>
+            <a:spLocks noGrp="1"/>
+          </p:cNvSpPr>
+          <p:nvPr>
+            <p:ph type="body" idx="1"/>
+          </p:nvPr>
+        </p:nvSpPr>
+        <p:spPr/>
+        <p:txBody>
+          <a:bodyPr/>
+          <a:lstStyle/>
+          <a:p>
+            <a:r>
+              <a:rPr lang="en-US" dirty="0"/>
+              <a:t>XXX</a:t>
+            </a:r>
+            <a:endParaRPr lang="en-NZ" dirty="0"/>
+          </a:p>
+        </p:txBody>
+      </p:sp>
+      <p:sp>
+        <p:nvSpPr>
+          <p:cNvPr id="4" name="Slide Number Placeholder 3">
+            <a:extLst>
+              <a:ext uri="{FF2B5EF4-FFF2-40B4-BE49-F238E27FC236}">
+                <a16:creationId xmlns:a16="http://schemas.microsoft.com/office/drawing/2014/main" id="{22BB2D68-4417-E2FF-6872-B04B454C59C1}"/>
+              </a:ext>
+            </a:extLst>
+          </p:cNvPr>
+          <p:cNvSpPr>
+            <a:spLocks noGrp="1"/>
+          </p:cNvSpPr>
+          <p:nvPr>
+            <p:ph type="sldNum" sz="quarter" idx="5"/>
+          </p:nvPr>
+        </p:nvSpPr>
+        <p:spPr/>
+        <p:txBody>
+          <a:bodyPr/>
+          <a:lstStyle/>
+          <a:p>
+            <a:fld id="{22FC436C-5653-4517-9B94-0BB68ACE2454}" type="slidenum">
+              <a:rPr lang="en-AU" smtClean="0"/>
+              <a:pPr/>
+              <a:t>20</a:t>
+            </a:fld>
+            <a:endParaRPr lang="en-AU"/>
+          </a:p>
+        </p:txBody>
+      </p:sp>
+    </p:spTree>
+    <p:extLst>
+      <p:ext uri="{BB962C8B-B14F-4D97-AF65-F5344CB8AC3E}">
+        <p14:creationId xmlns:p14="http://schemas.microsoft.com/office/powerpoint/2010/main" val="1508711771"/>
+      </p:ext>
+    </p:extLst>
+  </p:cSld>
+  <p:clrMapOvr>
+    <a:masterClrMapping/>
+  </p:clrMapOvr>
+</p:notes>
+</file>
+
+<file path=ppt/notesSlides/notesSlide21.xml><?xml version="1.0" encoding="utf-8"?>
+<p:notes xmlns:a="http://schemas.openxmlformats.org/drawingml/2006/main" xmlns:r="http://schemas.openxmlformats.org/officeDocument/2006/relationships" xmlns:p="http://schemas.openxmlformats.org/presentationml/2006/main">
+  <p:cSld>
+    <p:spTree>
+      <p:nvGrpSpPr>
+        <p:cNvPr id="1" name="">
+          <a:extLst>
+            <a:ext uri="{FF2B5EF4-FFF2-40B4-BE49-F238E27FC236}">
               <a16:creationId xmlns:a16="http://schemas.microsoft.com/office/drawing/2014/main" id="{A95AAA61-7883-75FA-7C0A-308EA5C81CAA}"/>
             </a:ext>
           </a:extLst>
@@ -4184,7 +4327,7 @@
             <a:fld id="{22FC436C-5653-4517-9B94-0BB68ACE2454}" type="slidenum">
               <a:rPr lang="en-AU" smtClean="0"/>
               <a:pPr/>
-              <a:t>20</a:t>
+              <a:t>21</a:t>
             </a:fld>
             <a:endParaRPr lang="en-AU"/>
           </a:p>
@@ -4203,7 +4346,7 @@
 </p:notes>
 </file>
 
-<file path=ppt/notesSlides/notesSlide21.xml><?xml version="1.0" encoding="utf-8"?>
+<file path=ppt/notesSlides/notesSlide22.xml><?xml version="1.0" encoding="utf-8"?>
 <p:notes xmlns:a="http://schemas.openxmlformats.org/drawingml/2006/main" xmlns:r="http://schemas.openxmlformats.org/officeDocument/2006/relationships" xmlns:p="http://schemas.openxmlformats.org/presentationml/2006/main">
   <p:cSld>
     <p:spTree>
@@ -4320,7 +4463,7 @@
             <a:fld id="{22FC436C-5653-4517-9B94-0BB68ACE2454}" type="slidenum">
               <a:rPr lang="en-AU" smtClean="0"/>
               <a:pPr/>
-              <a:t>21</a:t>
+              <a:t>22</a:t>
             </a:fld>
             <a:endParaRPr lang="en-AU"/>
           </a:p>
@@ -4339,7 +4482,7 @@
 </p:notes>
 </file>
 
-<file path=ppt/notesSlides/notesSlide22.xml><?xml version="1.0" encoding="utf-8"?>
+<file path=ppt/notesSlides/notesSlide23.xml><?xml version="1.0" encoding="utf-8"?>
 <p:notes xmlns:a="http://schemas.openxmlformats.org/drawingml/2006/main" xmlns:r="http://schemas.openxmlformats.org/officeDocument/2006/relationships" xmlns:p="http://schemas.openxmlformats.org/presentationml/2006/main">
   <p:cSld>
     <p:spTree>
@@ -4429,7 +4572,7 @@
             <a:fld id="{22FC436C-5653-4517-9B94-0BB68ACE2454}" type="slidenum">
               <a:rPr lang="en-AU" smtClean="0"/>
               <a:pPr/>
-              <a:t>22</a:t>
+              <a:t>23</a:t>
             </a:fld>
             <a:endParaRPr lang="en-AU"/>
           </a:p>
@@ -4439,95 +4582,6 @@
     <p:extLst>
       <p:ext uri="{BB962C8B-B14F-4D97-AF65-F5344CB8AC3E}">
         <p14:creationId xmlns:p14="http://schemas.microsoft.com/office/powerpoint/2010/main" val="2738456414"/>
-      </p:ext>
-    </p:extLst>
-  </p:cSld>
-  <p:clrMapOvr>
-    <a:masterClrMapping/>
-  </p:clrMapOvr>
-</p:notes>
-</file>
-
-<file path=ppt/notesSlides/notesSlide23.xml><?xml version="1.0" encoding="utf-8"?>
-<p:notes xmlns:a="http://schemas.openxmlformats.org/drawingml/2006/main" xmlns:r="http://schemas.openxmlformats.org/officeDocument/2006/relationships" xmlns:p="http://schemas.openxmlformats.org/presentationml/2006/main">
-  <p:cSld>
-    <p:spTree>
-      <p:nvGrpSpPr>
-        <p:cNvPr id="1" name=""/>
-        <p:cNvGrpSpPr/>
-        <p:nvPr/>
-      </p:nvGrpSpPr>
-      <p:grpSpPr>
-        <a:xfrm>
-          <a:off x="0" y="0"/>
-          <a:ext cx="0" cy="0"/>
-          <a:chOff x="0" y="0"/>
-          <a:chExt cx="0" cy="0"/>
-        </a:xfrm>
-      </p:grpSpPr>
-      <p:sp>
-        <p:nvSpPr>
-          <p:cNvPr id="2" name="Slide Image Placeholder 1"/>
-          <p:cNvSpPr>
-            <a:spLocks noGrp="1" noRot="1" noChangeAspect="1"/>
-          </p:cNvSpPr>
-          <p:nvPr>
-            <p:ph type="sldImg"/>
-          </p:nvPr>
-        </p:nvSpPr>
-        <p:spPr/>
-      </p:sp>
-      <p:sp>
-        <p:nvSpPr>
-          <p:cNvPr id="3" name="Notes Placeholder 2"/>
-          <p:cNvSpPr>
-            <a:spLocks noGrp="1"/>
-          </p:cNvSpPr>
-          <p:nvPr>
-            <p:ph type="body" idx="1"/>
-          </p:nvPr>
-        </p:nvSpPr>
-        <p:spPr/>
-        <p:txBody>
-          <a:bodyPr/>
-          <a:lstStyle/>
-          <a:p>
-            <a:r>
-              <a:rPr lang="en-US" dirty="0"/>
-              <a:t>In this game “full offset” between monetary and fiscal authorities would lead to both instruments going in opposite directions to infinity, unless there is a constraint on their actions. This is the purpose of the “adjustment cost from target” in this loss function. In a macro-model equilibrium could be generated by relative economic responses to the instruments.</a:t>
-            </a:r>
-            <a:endParaRPr lang="en-AU" dirty="0"/>
-          </a:p>
-        </p:txBody>
-      </p:sp>
-      <p:sp>
-        <p:nvSpPr>
-          <p:cNvPr id="4" name="Slide Number Placeholder 3"/>
-          <p:cNvSpPr>
-            <a:spLocks noGrp="1"/>
-          </p:cNvSpPr>
-          <p:nvPr>
-            <p:ph type="sldNum" sz="quarter" idx="5"/>
-          </p:nvPr>
-        </p:nvSpPr>
-        <p:spPr/>
-        <p:txBody>
-          <a:bodyPr/>
-          <a:lstStyle/>
-          <a:p>
-            <a:fld id="{22FC436C-5653-4517-9B94-0BB68ACE2454}" type="slidenum">
-              <a:rPr lang="en-AU" smtClean="0"/>
-              <a:pPr/>
-              <a:t>23</a:t>
-            </a:fld>
-            <a:endParaRPr lang="en-AU"/>
-          </a:p>
-        </p:txBody>
-      </p:sp>
-    </p:spTree>
-    <p:extLst>
-      <p:ext uri="{BB962C8B-B14F-4D97-AF65-F5344CB8AC3E}">
-        <p14:creationId xmlns:p14="http://schemas.microsoft.com/office/powerpoint/2010/main" val="511811182"/>
       </p:ext>
     </p:extLst>
   </p:cSld>
@@ -4583,39 +4637,9 @@
           <a:p>
             <a:r>
               <a:rPr lang="en-US" dirty="0"/>
-              <a:t>Supply shock leads to:</a:t>
-            </a:r>
-          </a:p>
-          <a:p>
-            <a:endParaRPr lang="en-US" dirty="0"/>
-          </a:p>
-          <a:p>
-            <a:pPr marL="228600" indent="-228600">
-              <a:buAutoNum type="arabicParenR"/>
-            </a:pPr>
-            <a:r>
-              <a:rPr lang="en-US" dirty="0"/>
-              <a:t>Similar economic outcomes in NE and cooperative!</a:t>
-            </a:r>
-          </a:p>
-          <a:p>
-            <a:pPr marL="228600" indent="-228600">
-              <a:buAutoNum type="arabicParenR"/>
-            </a:pPr>
-            <a:r>
-              <a:rPr lang="en-US" dirty="0"/>
-              <a:t>However, drastic change in relative policy settings in NE – if policy variability has a cost to social welfare then this is costly.</a:t>
-            </a:r>
-          </a:p>
-          <a:p>
-            <a:pPr marL="228600" indent="-228600">
-              <a:buAutoNum type="arabicParenR"/>
-            </a:pPr>
-            <a:r>
-              <a:rPr lang="en-US" dirty="0"/>
-              <a:t>Pre-commitment/leadership generates a “second-mover advantage”. If the central bank pre-commits we end up with the lowest inflation outcomes, as the second mover determines which target we move closest to.</a:t>
-            </a:r>
-            <a:endParaRPr lang="en-NZ" dirty="0"/>
+              <a:t>In this game “full offset” between monetary and fiscal authorities would lead to both instruments going in opposite directions to infinity, unless there is a constraint on their actions. This is the purpose of the “adjustment cost from target” in this loss function. In a macro-model equilibrium could be generated by relative economic responses to the instruments.</a:t>
+            </a:r>
+            <a:endParaRPr lang="en-AU" dirty="0"/>
           </a:p>
         </p:txBody>
       </p:sp>
@@ -4646,7 +4670,7 @@
     </p:spTree>
     <p:extLst>
       <p:ext uri="{BB962C8B-B14F-4D97-AF65-F5344CB8AC3E}">
-        <p14:creationId xmlns:p14="http://schemas.microsoft.com/office/powerpoint/2010/main" val="3166340555"/>
+        <p14:creationId xmlns:p14="http://schemas.microsoft.com/office/powerpoint/2010/main" val="511811182"/>
       </p:ext>
     </p:extLst>
   </p:cSld>
@@ -4700,12 +4724,21 @@
           <a:bodyPr/>
           <a:lstStyle/>
           <a:p>
+            <a:r>
+              <a:rPr lang="en-US" dirty="0"/>
+              <a:t>Supply shock leads to:</a:t>
+            </a:r>
+          </a:p>
+          <a:p>
+            <a:endParaRPr lang="en-US" dirty="0"/>
+          </a:p>
+          <a:p>
             <a:pPr marL="228600" indent="-228600">
               <a:buAutoNum type="arabicParenR"/>
             </a:pPr>
             <a:r>
               <a:rPr lang="en-US" dirty="0"/>
-              <a:t>The pre-commitment game reduces the “loss” to authorities through the cost of adjustment.</a:t>
+              <a:t>Similar economic outcomes in NE and cooperative!</a:t>
             </a:r>
           </a:p>
           <a:p>
@@ -4714,7 +4747,16 @@
             </a:pPr>
             <a:r>
               <a:rPr lang="en-US" dirty="0"/>
-              <a:t>However, if social welfare does not care about adjustment costs, then the pre-commitment outcomes are the worst among all.</a:t>
+              <a:t>However, drastic change in relative policy settings in NE – if policy variability has a cost to social welfare then this is costly.</a:t>
+            </a:r>
+          </a:p>
+          <a:p>
+            <a:pPr marL="228600" indent="-228600">
+              <a:buAutoNum type="arabicParenR"/>
+            </a:pPr>
+            <a:r>
+              <a:rPr lang="en-US" dirty="0"/>
+              <a:t>Pre-commitment/leadership generates a “second-mover advantage”. If the central bank pre-commits we end up with the lowest inflation outcomes, as the second mover determines which target we move closest to.</a:t>
             </a:r>
             <a:endParaRPr lang="en-NZ" dirty="0"/>
           </a:p>
@@ -4747,7 +4789,7 @@
     </p:spTree>
     <p:extLst>
       <p:ext uri="{BB962C8B-B14F-4D97-AF65-F5344CB8AC3E}">
-        <p14:creationId xmlns:p14="http://schemas.microsoft.com/office/powerpoint/2010/main" val="2032148869"/>
+        <p14:creationId xmlns:p14="http://schemas.microsoft.com/office/powerpoint/2010/main" val="3166340555"/>
       </p:ext>
     </p:extLst>
   </p:cSld>
@@ -4801,6 +4843,107 @@
           <a:bodyPr/>
           <a:lstStyle/>
           <a:p>
+            <a:pPr marL="228600" indent="-228600">
+              <a:buAutoNum type="arabicParenR"/>
+            </a:pPr>
+            <a:r>
+              <a:rPr lang="en-US" dirty="0"/>
+              <a:t>The pre-commitment game reduces the “loss” to authorities through the cost of adjustment.</a:t>
+            </a:r>
+          </a:p>
+          <a:p>
+            <a:pPr marL="228600" indent="-228600">
+              <a:buAutoNum type="arabicParenR"/>
+            </a:pPr>
+            <a:r>
+              <a:rPr lang="en-US" dirty="0"/>
+              <a:t>However, if social welfare does not care about adjustment costs, then the pre-commitment outcomes are the worst among all.</a:t>
+            </a:r>
+            <a:endParaRPr lang="en-NZ" dirty="0"/>
+          </a:p>
+        </p:txBody>
+      </p:sp>
+      <p:sp>
+        <p:nvSpPr>
+          <p:cNvPr id="4" name="Slide Number Placeholder 3"/>
+          <p:cNvSpPr>
+            <a:spLocks noGrp="1"/>
+          </p:cNvSpPr>
+          <p:nvPr>
+            <p:ph type="sldNum" sz="quarter" idx="5"/>
+          </p:nvPr>
+        </p:nvSpPr>
+        <p:spPr/>
+        <p:txBody>
+          <a:bodyPr/>
+          <a:lstStyle/>
+          <a:p>
+            <a:fld id="{22FC436C-5653-4517-9B94-0BB68ACE2454}" type="slidenum">
+              <a:rPr lang="en-AU" smtClean="0"/>
+              <a:pPr/>
+              <a:t>26</a:t>
+            </a:fld>
+            <a:endParaRPr lang="en-AU"/>
+          </a:p>
+        </p:txBody>
+      </p:sp>
+    </p:spTree>
+    <p:extLst>
+      <p:ext uri="{BB962C8B-B14F-4D97-AF65-F5344CB8AC3E}">
+        <p14:creationId xmlns:p14="http://schemas.microsoft.com/office/powerpoint/2010/main" val="2032148869"/>
+      </p:ext>
+    </p:extLst>
+  </p:cSld>
+  <p:clrMapOvr>
+    <a:masterClrMapping/>
+  </p:clrMapOvr>
+</p:notes>
+</file>
+
+<file path=ppt/notesSlides/notesSlide27.xml><?xml version="1.0" encoding="utf-8"?>
+<p:notes xmlns:a="http://schemas.openxmlformats.org/drawingml/2006/main" xmlns:r="http://schemas.openxmlformats.org/officeDocument/2006/relationships" xmlns:p="http://schemas.openxmlformats.org/presentationml/2006/main">
+  <p:cSld>
+    <p:spTree>
+      <p:nvGrpSpPr>
+        <p:cNvPr id="1" name=""/>
+        <p:cNvGrpSpPr/>
+        <p:nvPr/>
+      </p:nvGrpSpPr>
+      <p:grpSpPr>
+        <a:xfrm>
+          <a:off x="0" y="0"/>
+          <a:ext cx="0" cy="0"/>
+          <a:chOff x="0" y="0"/>
+          <a:chExt cx="0" cy="0"/>
+        </a:xfrm>
+      </p:grpSpPr>
+      <p:sp>
+        <p:nvSpPr>
+          <p:cNvPr id="2" name="Slide Image Placeholder 1"/>
+          <p:cNvSpPr>
+            <a:spLocks noGrp="1" noRot="1" noChangeAspect="1"/>
+          </p:cNvSpPr>
+          <p:nvPr>
+            <p:ph type="sldImg"/>
+          </p:nvPr>
+        </p:nvSpPr>
+        <p:spPr/>
+      </p:sp>
+      <p:sp>
+        <p:nvSpPr>
+          <p:cNvPr id="3" name="Notes Placeholder 2"/>
+          <p:cNvSpPr>
+            <a:spLocks noGrp="1"/>
+          </p:cNvSpPr>
+          <p:nvPr>
+            <p:ph type="body" idx="1"/>
+          </p:nvPr>
+        </p:nvSpPr>
+        <p:spPr/>
+        <p:txBody>
+          <a:bodyPr/>
+          <a:lstStyle/>
+          <a:p>
             <a:endParaRPr lang="en-AU"/>
           </a:p>
         </p:txBody>
@@ -4823,7 +4966,7 @@
             <a:fld id="{22FC436C-5653-4517-9B94-0BB68ACE2454}" type="slidenum">
               <a:rPr lang="en-AU" smtClean="0"/>
               <a:pPr/>
-              <a:t>26</a:t>
+              <a:t>27</a:t>
             </a:fld>
             <a:endParaRPr lang="en-AU"/>
           </a:p>
@@ -4998,6 +5141,178 @@
         <p:cNvPr id="1" name="">
           <a:extLst>
             <a:ext uri="{FF2B5EF4-FFF2-40B4-BE49-F238E27FC236}">
+              <a16:creationId xmlns:a16="http://schemas.microsoft.com/office/drawing/2014/main" id="{1E83B706-C7A2-9286-DA5B-D116C44B0C5F}"/>
+            </a:ext>
+          </a:extLst>
+        </p:cNvPr>
+        <p:cNvGrpSpPr/>
+        <p:nvPr/>
+      </p:nvGrpSpPr>
+      <p:grpSpPr>
+        <a:xfrm>
+          <a:off x="0" y="0"/>
+          <a:ext cx="0" cy="0"/>
+          <a:chOff x="0" y="0"/>
+          <a:chExt cx="0" cy="0"/>
+        </a:xfrm>
+      </p:grpSpPr>
+      <p:sp>
+        <p:nvSpPr>
+          <p:cNvPr id="2" name="Slide Image Placeholder 1">
+            <a:extLst>
+              <a:ext uri="{FF2B5EF4-FFF2-40B4-BE49-F238E27FC236}">
+                <a16:creationId xmlns:a16="http://schemas.microsoft.com/office/drawing/2014/main" id="{E8A3E2E8-7D3D-57CD-CB6F-E0F43233936C}"/>
+              </a:ext>
+            </a:extLst>
+          </p:cNvPr>
+          <p:cNvSpPr>
+            <a:spLocks noGrp="1" noRot="1" noChangeAspect="1"/>
+          </p:cNvSpPr>
+          <p:nvPr>
+            <p:ph type="sldImg"/>
+          </p:nvPr>
+        </p:nvSpPr>
+        <p:spPr/>
+      </p:sp>
+      <p:sp>
+        <p:nvSpPr>
+          <p:cNvPr id="3" name="Notes Placeholder 2">
+            <a:extLst>
+              <a:ext uri="{FF2B5EF4-FFF2-40B4-BE49-F238E27FC236}">
+                <a16:creationId xmlns:a16="http://schemas.microsoft.com/office/drawing/2014/main" id="{492CCA21-97A5-F912-387A-707619ABFFE8}"/>
+              </a:ext>
+            </a:extLst>
+          </p:cNvPr>
+          <p:cNvSpPr>
+            <a:spLocks noGrp="1"/>
+          </p:cNvSpPr>
+          <p:nvPr>
+            <p:ph type="body" idx="1"/>
+          </p:nvPr>
+        </p:nvSpPr>
+        <p:spPr/>
+        <p:txBody>
+          <a:bodyPr>
+            <a:normAutofit fontScale="92500" lnSpcReduction="20000"/>
+          </a:bodyPr>
+          <a:lstStyle/>
+          <a:p>
+            <a:r>
+              <a:rPr lang="en-AU" dirty="0"/>
+              <a:t>Endogenous independence means that the central bank or fiscal authority can set up a costly structure to commit to actions in the future – they could do this by making it costly to change their behaviour, by increasing their future benefit of doing something, by manipulating their own objective function.  Ultimately, we can show that agents in a non-cooperative game will have an incentive to select into a “inefficient” rule or impose a cost on changing their announced behaviour, in order to influence the future decisions of the other party they are in a non-cooperative game with.</a:t>
+            </a:r>
+          </a:p>
+          <a:p>
+            <a:endParaRPr lang="en-AU" dirty="0"/>
+          </a:p>
+          <a:p>
+            <a:r>
+              <a:rPr lang="en-AU" dirty="0"/>
+              <a:t>What is an example.  If the central bank was to announce they will hold interest rates at zero until a certain date, it is costly for them to change that – in terms of reputation.  If the central bank purchases bonds, there is a monetary cost associated with lifting interest rates that will prevent them from doing so. If the government commits to an annual budget process, their ability to introduce discretionary changes in policy will be restricted and more costly to introduce.  All of these common fiscal and monetary policy settings in the current institutional environment look like pre-commitment devices.</a:t>
+            </a:r>
+          </a:p>
+          <a:p>
+            <a:endParaRPr lang="en-AU" dirty="0"/>
+          </a:p>
+          <a:p>
+            <a:r>
+              <a:rPr lang="en-AU" dirty="0"/>
+              <a:t>For the final bullet – a key point not made in the game theory of monetary policy literature is how different the game is given different economic shocks.  A supply shock and a demand shock lead a very different “conflict” between monetary and fiscal authorities.</a:t>
+            </a:r>
+          </a:p>
+          <a:p>
+            <a:endParaRPr lang="en-AU" dirty="0"/>
+          </a:p>
+          <a:p>
+            <a:r>
+              <a:rPr lang="en-AU" dirty="0"/>
+              <a:t>Modelling</a:t>
+            </a:r>
+          </a:p>
+          <a:p>
+            <a:pPr lvl="1"/>
+            <a:r>
+              <a:rPr lang="en-AU" dirty="0"/>
+              <a:t>“cooperative” vs “noncooperative” responses to shocks,</a:t>
+            </a:r>
+          </a:p>
+          <a:p>
+            <a:pPr lvl="1"/>
+            <a:r>
+              <a:rPr lang="en-AU" dirty="0"/>
+              <a:t>Pre-commitment to policy settings through sequential games,</a:t>
+            </a:r>
+          </a:p>
+          <a:p>
+            <a:pPr lvl="1"/>
+            <a:r>
+              <a:rPr lang="en-AU" dirty="0"/>
+              <a:t>Endogenous independence as costly pre-commitment?</a:t>
+            </a:r>
+          </a:p>
+          <a:p>
+            <a:pPr lvl="1"/>
+            <a:r>
+              <a:rPr lang="en-AU" dirty="0"/>
+              <a:t>Policy targets, target asymmetry, and outcomes (i.e. can government deal with the inequality consequences of monetary policy).</a:t>
+            </a:r>
+          </a:p>
+          <a:p>
+            <a:endParaRPr lang="en-AU" dirty="0"/>
+          </a:p>
+        </p:txBody>
+      </p:sp>
+      <p:sp>
+        <p:nvSpPr>
+          <p:cNvPr id="4" name="Slide Number Placeholder 3">
+            <a:extLst>
+              <a:ext uri="{FF2B5EF4-FFF2-40B4-BE49-F238E27FC236}">
+                <a16:creationId xmlns:a16="http://schemas.microsoft.com/office/drawing/2014/main" id="{01970877-C681-4DC4-E45E-AD0BB1E97BF9}"/>
+              </a:ext>
+            </a:extLst>
+          </p:cNvPr>
+          <p:cNvSpPr>
+            <a:spLocks noGrp="1"/>
+          </p:cNvSpPr>
+          <p:nvPr>
+            <p:ph type="sldNum" sz="quarter" idx="5"/>
+          </p:nvPr>
+        </p:nvSpPr>
+        <p:spPr/>
+        <p:txBody>
+          <a:bodyPr/>
+          <a:lstStyle/>
+          <a:p>
+            <a:fld id="{22FC436C-5653-4517-9B94-0BB68ACE2454}" type="slidenum">
+              <a:rPr lang="en-AU" smtClean="0"/>
+              <a:pPr/>
+              <a:t>4</a:t>
+            </a:fld>
+            <a:endParaRPr lang="en-AU"/>
+          </a:p>
+        </p:txBody>
+      </p:sp>
+    </p:spTree>
+    <p:extLst>
+      <p:ext uri="{BB962C8B-B14F-4D97-AF65-F5344CB8AC3E}">
+        <p14:creationId xmlns:p14="http://schemas.microsoft.com/office/powerpoint/2010/main" val="1550649611"/>
+      </p:ext>
+    </p:extLst>
+  </p:cSld>
+  <p:clrMapOvr>
+    <a:masterClrMapping/>
+  </p:clrMapOvr>
+</p:notes>
+</file>
+
+<file path=ppt/notesSlides/notesSlide5.xml><?xml version="1.0" encoding="utf-8"?>
+<p:notes xmlns:a="http://schemas.openxmlformats.org/drawingml/2006/main" xmlns:r="http://schemas.openxmlformats.org/officeDocument/2006/relationships" xmlns:p="http://schemas.openxmlformats.org/presentationml/2006/main">
+  <p:cSld>
+    <p:spTree>
+      <p:nvGrpSpPr>
+        <p:cNvPr id="1" name="">
+          <a:extLst>
+            <a:ext uri="{FF2B5EF4-FFF2-40B4-BE49-F238E27FC236}">
               <a16:creationId xmlns:a16="http://schemas.microsoft.com/office/drawing/2014/main" id="{FB10017B-03A6-5ADD-75C0-E81B870BAA21}"/>
             </a:ext>
           </a:extLst>
@@ -5143,7 +5458,7 @@
             <a:fld id="{22FC436C-5653-4517-9B94-0BB68ACE2454}" type="slidenum">
               <a:rPr lang="en-AU" smtClean="0"/>
               <a:pPr/>
-              <a:t>4</a:t>
+              <a:t>5</a:t>
             </a:fld>
             <a:endParaRPr lang="en-AU"/>
           </a:p>
@@ -5153,254 +5468,6 @@
     <p:extLst>
       <p:ext uri="{BB962C8B-B14F-4D97-AF65-F5344CB8AC3E}">
         <p14:creationId xmlns:p14="http://schemas.microsoft.com/office/powerpoint/2010/main" val="3000836246"/>
-      </p:ext>
-    </p:extLst>
-  </p:cSld>
-  <p:clrMapOvr>
-    <a:masterClrMapping/>
-  </p:clrMapOvr>
-</p:notes>
-</file>
-
-<file path=ppt/notesSlides/notesSlide5.xml><?xml version="1.0" encoding="utf-8"?>
-<p:notes xmlns:a="http://schemas.openxmlformats.org/drawingml/2006/main" xmlns:r="http://schemas.openxmlformats.org/officeDocument/2006/relationships" xmlns:p="http://schemas.openxmlformats.org/presentationml/2006/main">
-  <p:cSld>
-    <p:spTree>
-      <p:nvGrpSpPr>
-        <p:cNvPr id="1" name=""/>
-        <p:cNvGrpSpPr/>
-        <p:nvPr/>
-      </p:nvGrpSpPr>
-      <p:grpSpPr>
-        <a:xfrm>
-          <a:off x="0" y="0"/>
-          <a:ext cx="0" cy="0"/>
-          <a:chOff x="0" y="0"/>
-          <a:chExt cx="0" cy="0"/>
-        </a:xfrm>
-      </p:grpSpPr>
-      <p:sp>
-        <p:nvSpPr>
-          <p:cNvPr id="2" name="Slide Image Placeholder 1"/>
-          <p:cNvSpPr>
-            <a:spLocks noGrp="1" noRot="1" noChangeAspect="1"/>
-          </p:cNvSpPr>
-          <p:nvPr>
-            <p:ph type="sldImg"/>
-          </p:nvPr>
-        </p:nvSpPr>
-        <p:spPr/>
-      </p:sp>
-      <p:sp>
-        <p:nvSpPr>
-          <p:cNvPr id="3" name="Notes Placeholder 2"/>
-          <p:cNvSpPr>
-            <a:spLocks noGrp="1"/>
-          </p:cNvSpPr>
-          <p:nvPr>
-            <p:ph type="body" idx="1"/>
-          </p:nvPr>
-        </p:nvSpPr>
-        <p:spPr/>
-        <p:txBody>
-          <a:bodyPr>
-            <a:normAutofit fontScale="47500" lnSpcReduction="20000"/>
-          </a:bodyPr>
-          <a:lstStyle/>
-          <a:p>
-            <a:r>
-              <a:rPr lang="en-AU" dirty="0"/>
-              <a:t>Introduction:</a:t>
-            </a:r>
-          </a:p>
-          <a:p>
-            <a:endParaRPr lang="en-AU" dirty="0"/>
-          </a:p>
-          <a:p>
-            <a:r>
-              <a:rPr lang="en-AU" dirty="0"/>
-              <a:t>Monetary policy independence matters for anchoring inflation expectations and mitigating the “time inconsistency” problem that exists between government and the public with regards to monetary policy. However, the crises of the last 20 years have shown that there are limits to this independence – and a blurry line between what constitutes fiscal and monetary policy. Quantitative easing, forward guidance, and fiscal dominance are all active policy areas of research where the relationship between fiscal and monetary policy rules becomes complex.  In this piece we hope to inform these debates.</a:t>
-            </a:r>
-          </a:p>
-          <a:p>
-            <a:endParaRPr lang="en-AU" dirty="0"/>
-          </a:p>
-          <a:p>
-            <a:r>
-              <a:rPr lang="en-AU" dirty="0"/>
-              <a:t>Monetary-fiscal coordination can reflect two separate concerns:</a:t>
-            </a:r>
-          </a:p>
-          <a:p>
-            <a:endParaRPr lang="en-AU" dirty="0"/>
-          </a:p>
-          <a:p>
-            <a:r>
-              <a:rPr lang="en-AU" dirty="0"/>
-              <a:t>1) Crisis management: The timing, size, and information about announcements may be better organised in the short-term to make sure that responses to a crisis are effective and measured.</a:t>
-            </a:r>
-          </a:p>
-          <a:p>
-            <a:r>
-              <a:rPr lang="en-AU" dirty="0"/>
-              <a:t>2) Objective relationships: The fiscal and monetary policy rules may interact in unintended ways relative to a welfare maximising dynamic path, in ways that may be difficult to tease out. These may situations where policies offset, or where they support each other.</a:t>
-            </a:r>
-          </a:p>
-          <a:p>
-            <a:endParaRPr lang="en-AU" dirty="0"/>
-          </a:p>
-          <a:p>
-            <a:r>
-              <a:rPr lang="en-AU" dirty="0"/>
-              <a:t>We believe that non-cooperative game theory – specifically a dynamic game with policy adjustment costs – can provide novel insights into this second form of monetary-fiscal coordination, the nature of fiscal and monetary policy rules, and potential pitfalls of strict monetary or fiscal leadership/independence.</a:t>
-            </a:r>
-          </a:p>
-          <a:p>
-            <a:endParaRPr lang="en-AU" dirty="0"/>
-          </a:p>
-          <a:p>
-            <a:endParaRPr lang="en-AU" dirty="0"/>
-          </a:p>
-          <a:p>
-            <a:endParaRPr lang="en-AU" dirty="0"/>
-          </a:p>
-          <a:p>
-            <a:endParaRPr lang="en-AU" dirty="0"/>
-          </a:p>
-          <a:p>
-            <a:endParaRPr lang="en-AU" dirty="0"/>
-          </a:p>
-          <a:p>
-            <a:endParaRPr lang="en-AU" dirty="0"/>
-          </a:p>
-          <a:p>
-            <a:endParaRPr lang="en-AU" dirty="0"/>
-          </a:p>
-          <a:p>
-            <a:r>
-              <a:rPr lang="en-AU" dirty="0"/>
-              <a:t>########################</a:t>
-            </a:r>
-          </a:p>
-          <a:p>
-            <a:endParaRPr lang="en-AU" dirty="0"/>
-          </a:p>
-          <a:p>
-            <a:r>
-              <a:rPr lang="en-AU" dirty="0"/>
-              <a:t>It is common to look at fiscal and monetary policy decision making separately when analysing optimal policy – with the </a:t>
-            </a:r>
-            <a:r>
-              <a:rPr lang="en-AU" dirty="0" err="1"/>
-              <a:t>Kyland</a:t>
-            </a:r>
-            <a:r>
-              <a:rPr lang="en-AU" dirty="0"/>
-              <a:t> Prescott (1977) motivation for independence due to time inconsistency being used as a justification for an independent central bank, which weighs inflation more heavily than a “social planner” would. Since the Global Financial Crisis, it has become clearer that monetary and fiscal authorities' roles can be intertwined, and that there are benefits from coordination. Furthermore, forward guidance and debate about fiscal dominance and monetary policy offset have become major areas of investigation. There are two ways that coordination/cooperation matter:</a:t>
-            </a:r>
-            <a:br>
-              <a:rPr lang="en-AU" dirty="0"/>
-            </a:br>
-            <a:br>
-              <a:rPr lang="en-AU" dirty="0"/>
-            </a:br>
-            <a:r>
-              <a:rPr lang="en-AU" dirty="0"/>
-              <a:t>1) Crisis management: The timing, size, and information about announcements may be better organised in the short-term to make sure that responses to a crisis are effective and measured.</a:t>
-            </a:r>
-          </a:p>
-          <a:p>
-            <a:r>
-              <a:rPr lang="en-AU" dirty="0"/>
-              <a:t>2) Objective relationships: The fiscal and monetary policy rules may interact in unintended ways relative to a welfare maximising dynamic path, in ways that may be difficult to tease out. These may situations where policies offset, or where they support each other.</a:t>
-            </a:r>
-          </a:p>
-          <a:p>
-            <a:endParaRPr lang="en-AU" dirty="0"/>
-          </a:p>
-          <a:p>
-            <a:r>
-              <a:rPr lang="en-AU" dirty="0"/>
-              <a:t>We believe that non-cooperative game theory – specifically a dynamic game with policy adjustment costs – can provide novel insights into this second form of monetary-fiscal coordination, the nature of fiscal and monetary policy rules, and potential pitfalls of strict monetary or fiscal leadership/independence.</a:t>
-            </a:r>
-            <a:br>
-              <a:rPr lang="en-AU" dirty="0"/>
-            </a:br>
-            <a:br>
-              <a:rPr lang="en-AU" dirty="0"/>
-            </a:br>
-            <a:br>
-              <a:rPr lang="en-AU" dirty="0"/>
-            </a:br>
-            <a:r>
-              <a:rPr lang="en-AU" dirty="0"/>
-              <a:t>####################################</a:t>
-            </a:r>
-            <a:br>
-              <a:rPr lang="en-AU" dirty="0"/>
-            </a:br>
-            <a:r>
-              <a:rPr lang="en-AU" dirty="0"/>
-              <a:t>Few comments:</a:t>
-            </a:r>
-          </a:p>
-          <a:p>
-            <a:r>
-              <a:rPr lang="en-AU" dirty="0"/>
-              <a:t>What is the role of expectations in the game? Do/ can we incorporate it?</a:t>
-            </a:r>
-          </a:p>
-          <a:p>
-            <a:r>
-              <a:rPr lang="en-AU" dirty="0"/>
-              <a:t>Why do we need to generalise the model? </a:t>
-            </a:r>
-          </a:p>
-          <a:p>
-            <a:r>
-              <a:rPr lang="en-AU" dirty="0"/>
-              <a:t>What is the question we are trying to answer?</a:t>
-            </a:r>
-          </a:p>
-          <a:p>
-            <a:r>
-              <a:rPr lang="en-AU" dirty="0"/>
-              <a:t>Based or on top of what has already been done, what explicitly are we proposing? </a:t>
-            </a:r>
-          </a:p>
-          <a:p>
-            <a:endParaRPr lang="en-AU" dirty="0"/>
-          </a:p>
-        </p:txBody>
-      </p:sp>
-      <p:sp>
-        <p:nvSpPr>
-          <p:cNvPr id="4" name="Slide Number Placeholder 3"/>
-          <p:cNvSpPr>
-            <a:spLocks noGrp="1"/>
-          </p:cNvSpPr>
-          <p:nvPr>
-            <p:ph type="sldNum" sz="quarter" idx="5"/>
-          </p:nvPr>
-        </p:nvSpPr>
-        <p:spPr/>
-        <p:txBody>
-          <a:bodyPr/>
-          <a:lstStyle/>
-          <a:p>
-            <a:fld id="{22FC436C-5653-4517-9B94-0BB68ACE2454}" type="slidenum">
-              <a:rPr lang="en-AU" smtClean="0"/>
-              <a:pPr/>
-              <a:t>5</a:t>
-            </a:fld>
-            <a:endParaRPr lang="en-AU"/>
-          </a:p>
-        </p:txBody>
-      </p:sp>
-    </p:spTree>
-    <p:extLst>
-      <p:ext uri="{BB962C8B-B14F-4D97-AF65-F5344CB8AC3E}">
-        <p14:creationId xmlns:p14="http://schemas.microsoft.com/office/powerpoint/2010/main" val="3998565920"/>
       </p:ext>
     </p:extLst>
   </p:cSld>
@@ -5451,43 +5518,173 @@
         </p:nvSpPr>
         <p:spPr/>
         <p:txBody>
-          <a:bodyPr/>
+          <a:bodyPr>
+            <a:normAutofit fontScale="47500" lnSpcReduction="20000"/>
+          </a:bodyPr>
           <a:lstStyle/>
           <a:p>
             <a:r>
               <a:rPr lang="en-AU" dirty="0"/>
-              <a:t>To sum up, our main contributions are:</a:t>
+              <a:t>Introduction:</a:t>
             </a:r>
           </a:p>
           <a:p>
             <a:endParaRPr lang="en-AU" dirty="0"/>
           </a:p>
           <a:p>
-            <a:pPr marL="228600" indent="-228600">
-              <a:buAutoNum type="arabicParenR"/>
-            </a:pPr>
             <a:r>
               <a:rPr lang="en-AU" dirty="0"/>
-              <a:t>A dynamic game theory model that allows for pre-commitment.</a:t>
-            </a:r>
-          </a:p>
-          <a:p>
-            <a:pPr marL="228600" indent="-228600">
-              <a:buAutoNum type="arabicParenR"/>
-            </a:pPr>
+              <a:t>Monetary policy independence matters for anchoring inflation expectations and mitigating the “time inconsistency” problem that exists between government and the public with regards to monetary policy. However, the crises of the last 20 years have shown that there are limits to this independence – and a blurry line between what constitutes fiscal and monetary policy. Quantitative easing, forward guidance, and fiscal dominance are all active policy areas of research where the relationship between fiscal and monetary policy rules becomes complex.  In this piece we hope to inform these debates.</a:t>
+            </a:r>
+          </a:p>
+          <a:p>
+            <a:endParaRPr lang="en-AU" dirty="0"/>
+          </a:p>
+          <a:p>
             <a:r>
               <a:rPr lang="en-AU" dirty="0"/>
-              <a:t>A discussion of how monetary fiscal conflict varies on the basis of supply vs demand shocks.</a:t>
-            </a:r>
-          </a:p>
-          <a:p>
-            <a:pPr marL="228600" indent="-228600">
-              <a:buAutoNum type="arabicParenR"/>
-            </a:pPr>
+              <a:t>Monetary-fiscal coordination can reflect two separate concerns:</a:t>
+            </a:r>
+          </a:p>
+          <a:p>
+            <a:endParaRPr lang="en-AU" dirty="0"/>
+          </a:p>
+          <a:p>
             <a:r>
               <a:rPr lang="en-AU" dirty="0"/>
-              <a:t>Endogenous determination of commitment regimes and their relation to social welfare.</a:t>
-            </a:r>
+              <a:t>1) Crisis management: The timing, size, and information about announcements may be better organised in the short-term to make sure that responses to a crisis are effective and measured.</a:t>
+            </a:r>
+          </a:p>
+          <a:p>
+            <a:r>
+              <a:rPr lang="en-AU" dirty="0"/>
+              <a:t>2) Objective relationships: The fiscal and monetary policy rules may interact in unintended ways relative to a welfare maximising dynamic path, in ways that may be difficult to tease out. These may situations where policies offset, or where they support each other.</a:t>
+            </a:r>
+          </a:p>
+          <a:p>
+            <a:endParaRPr lang="en-AU" dirty="0"/>
+          </a:p>
+          <a:p>
+            <a:r>
+              <a:rPr lang="en-AU" dirty="0"/>
+              <a:t>We believe that non-cooperative game theory – specifically a dynamic game with policy adjustment costs – can provide novel insights into this second form of monetary-fiscal coordination, the nature of fiscal and monetary policy rules, and potential pitfalls of strict monetary or fiscal leadership/independence.</a:t>
+            </a:r>
+          </a:p>
+          <a:p>
+            <a:endParaRPr lang="en-AU" dirty="0"/>
+          </a:p>
+          <a:p>
+            <a:endParaRPr lang="en-AU" dirty="0"/>
+          </a:p>
+          <a:p>
+            <a:endParaRPr lang="en-AU" dirty="0"/>
+          </a:p>
+          <a:p>
+            <a:endParaRPr lang="en-AU" dirty="0"/>
+          </a:p>
+          <a:p>
+            <a:endParaRPr lang="en-AU" dirty="0"/>
+          </a:p>
+          <a:p>
+            <a:endParaRPr lang="en-AU" dirty="0"/>
+          </a:p>
+          <a:p>
+            <a:endParaRPr lang="en-AU" dirty="0"/>
+          </a:p>
+          <a:p>
+            <a:r>
+              <a:rPr lang="en-AU" dirty="0"/>
+              <a:t>########################</a:t>
+            </a:r>
+          </a:p>
+          <a:p>
+            <a:endParaRPr lang="en-AU" dirty="0"/>
+          </a:p>
+          <a:p>
+            <a:r>
+              <a:rPr lang="en-AU" dirty="0"/>
+              <a:t>It is common to look at fiscal and monetary policy decision making separately when analysing optimal policy – with the </a:t>
+            </a:r>
+            <a:r>
+              <a:rPr lang="en-AU" dirty="0" err="1"/>
+              <a:t>Kyland</a:t>
+            </a:r>
+            <a:r>
+              <a:rPr lang="en-AU" dirty="0"/>
+              <a:t> Prescott (1977) motivation for independence due to time inconsistency being used as a justification for an independent central bank, which weighs inflation more heavily than a “social planner” would. Since the Global Financial Crisis, it has become clearer that monetary and fiscal authorities' roles can be intertwined, and that there are benefits from coordination. Furthermore, forward guidance and debate about fiscal dominance and monetary policy offset have become major areas of investigation. There are two ways that coordination/cooperation matter:</a:t>
+            </a:r>
+            <a:br>
+              <a:rPr lang="en-AU" dirty="0"/>
+            </a:br>
+            <a:br>
+              <a:rPr lang="en-AU" dirty="0"/>
+            </a:br>
+            <a:r>
+              <a:rPr lang="en-AU" dirty="0"/>
+              <a:t>1) Crisis management: The timing, size, and information about announcements may be better organised in the short-term to make sure that responses to a crisis are effective and measured.</a:t>
+            </a:r>
+          </a:p>
+          <a:p>
+            <a:r>
+              <a:rPr lang="en-AU" dirty="0"/>
+              <a:t>2) Objective relationships: The fiscal and monetary policy rules may interact in unintended ways relative to a welfare maximising dynamic path, in ways that may be difficult to tease out. These may situations where policies offset, or where they support each other.</a:t>
+            </a:r>
+          </a:p>
+          <a:p>
+            <a:endParaRPr lang="en-AU" dirty="0"/>
+          </a:p>
+          <a:p>
+            <a:r>
+              <a:rPr lang="en-AU" dirty="0"/>
+              <a:t>We believe that non-cooperative game theory – specifically a dynamic game with policy adjustment costs – can provide novel insights into this second form of monetary-fiscal coordination, the nature of fiscal and monetary policy rules, and potential pitfalls of strict monetary or fiscal leadership/independence.</a:t>
+            </a:r>
+            <a:br>
+              <a:rPr lang="en-AU" dirty="0"/>
+            </a:br>
+            <a:br>
+              <a:rPr lang="en-AU" dirty="0"/>
+            </a:br>
+            <a:br>
+              <a:rPr lang="en-AU" dirty="0"/>
+            </a:br>
+            <a:r>
+              <a:rPr lang="en-AU" dirty="0"/>
+              <a:t>####################################</a:t>
+            </a:r>
+            <a:br>
+              <a:rPr lang="en-AU" dirty="0"/>
+            </a:br>
+            <a:r>
+              <a:rPr lang="en-AU" dirty="0"/>
+              <a:t>Few comments:</a:t>
+            </a:r>
+          </a:p>
+          <a:p>
+            <a:r>
+              <a:rPr lang="en-AU" dirty="0"/>
+              <a:t>What is the role of expectations in the game? Do/ can we incorporate it?</a:t>
+            </a:r>
+          </a:p>
+          <a:p>
+            <a:r>
+              <a:rPr lang="en-AU" dirty="0"/>
+              <a:t>Why do we need to generalise the model? </a:t>
+            </a:r>
+          </a:p>
+          <a:p>
+            <a:r>
+              <a:rPr lang="en-AU" dirty="0"/>
+              <a:t>What is the question we are trying to answer?</a:t>
+            </a:r>
+          </a:p>
+          <a:p>
+            <a:r>
+              <a:rPr lang="en-AU" dirty="0"/>
+              <a:t>Based or on top of what has already been done, what explicitly are we proposing? </a:t>
+            </a:r>
+          </a:p>
+          <a:p>
+            <a:endParaRPr lang="en-AU" dirty="0"/>
           </a:p>
         </p:txBody>
       </p:sp>
@@ -5510,6 +5707,124 @@
               <a:rPr lang="en-AU" smtClean="0"/>
               <a:pPr/>
               <a:t>6</a:t>
+            </a:fld>
+            <a:endParaRPr lang="en-AU"/>
+          </a:p>
+        </p:txBody>
+      </p:sp>
+    </p:spTree>
+    <p:extLst>
+      <p:ext uri="{BB962C8B-B14F-4D97-AF65-F5344CB8AC3E}">
+        <p14:creationId xmlns:p14="http://schemas.microsoft.com/office/powerpoint/2010/main" val="3998565920"/>
+      </p:ext>
+    </p:extLst>
+  </p:cSld>
+  <p:clrMapOvr>
+    <a:masterClrMapping/>
+  </p:clrMapOvr>
+</p:notes>
+</file>
+
+<file path=ppt/notesSlides/notesSlide7.xml><?xml version="1.0" encoding="utf-8"?>
+<p:notes xmlns:a="http://schemas.openxmlformats.org/drawingml/2006/main" xmlns:r="http://schemas.openxmlformats.org/officeDocument/2006/relationships" xmlns:p="http://schemas.openxmlformats.org/presentationml/2006/main">
+  <p:cSld>
+    <p:spTree>
+      <p:nvGrpSpPr>
+        <p:cNvPr id="1" name=""/>
+        <p:cNvGrpSpPr/>
+        <p:nvPr/>
+      </p:nvGrpSpPr>
+      <p:grpSpPr>
+        <a:xfrm>
+          <a:off x="0" y="0"/>
+          <a:ext cx="0" cy="0"/>
+          <a:chOff x="0" y="0"/>
+          <a:chExt cx="0" cy="0"/>
+        </a:xfrm>
+      </p:grpSpPr>
+      <p:sp>
+        <p:nvSpPr>
+          <p:cNvPr id="2" name="Slide Image Placeholder 1"/>
+          <p:cNvSpPr>
+            <a:spLocks noGrp="1" noRot="1" noChangeAspect="1"/>
+          </p:cNvSpPr>
+          <p:nvPr>
+            <p:ph type="sldImg"/>
+          </p:nvPr>
+        </p:nvSpPr>
+        <p:spPr/>
+      </p:sp>
+      <p:sp>
+        <p:nvSpPr>
+          <p:cNvPr id="3" name="Notes Placeholder 2"/>
+          <p:cNvSpPr>
+            <a:spLocks noGrp="1"/>
+          </p:cNvSpPr>
+          <p:nvPr>
+            <p:ph type="body" idx="1"/>
+          </p:nvPr>
+        </p:nvSpPr>
+        <p:spPr/>
+        <p:txBody>
+          <a:bodyPr/>
+          <a:lstStyle/>
+          <a:p>
+            <a:r>
+              <a:rPr lang="en-AU" dirty="0"/>
+              <a:t>To sum up, our main contributions are:</a:t>
+            </a:r>
+          </a:p>
+          <a:p>
+            <a:endParaRPr lang="en-AU" dirty="0"/>
+          </a:p>
+          <a:p>
+            <a:pPr marL="228600" indent="-228600">
+              <a:buAutoNum type="arabicParenR"/>
+            </a:pPr>
+            <a:r>
+              <a:rPr lang="en-AU" dirty="0"/>
+              <a:t>A dynamic game theory model that allows for pre-commitment.</a:t>
+            </a:r>
+          </a:p>
+          <a:p>
+            <a:pPr marL="228600" indent="-228600">
+              <a:buAutoNum type="arabicParenR"/>
+            </a:pPr>
+            <a:r>
+              <a:rPr lang="en-AU" dirty="0"/>
+              <a:t>A discussion of how monetary fiscal conflict varies on the basis of supply vs demand shocks.</a:t>
+            </a:r>
+          </a:p>
+          <a:p>
+            <a:pPr marL="228600" indent="-228600">
+              <a:buAutoNum type="arabicParenR"/>
+            </a:pPr>
+            <a:r>
+              <a:rPr lang="en-AU" dirty="0"/>
+              <a:t>Endogenous determination of commitment regimes and their relation to social welfare.</a:t>
+            </a:r>
+          </a:p>
+        </p:txBody>
+      </p:sp>
+      <p:sp>
+        <p:nvSpPr>
+          <p:cNvPr id="4" name="Slide Number Placeholder 3"/>
+          <p:cNvSpPr>
+            <a:spLocks noGrp="1"/>
+          </p:cNvSpPr>
+          <p:nvPr>
+            <p:ph type="sldNum" sz="quarter" idx="5"/>
+          </p:nvPr>
+        </p:nvSpPr>
+        <p:spPr/>
+        <p:txBody>
+          <a:bodyPr/>
+          <a:lstStyle/>
+          <a:p>
+            <a:fld id="{22FC436C-5653-4517-9B94-0BB68ACE2454}" type="slidenum">
+              <a:rPr lang="en-AU" smtClean="0"/>
+              <a:pPr/>
+              <a:t>7</a:t>
             </a:fld>
             <a:endParaRPr lang="en-AU"/>
           </a:p>
@@ -5528,7 +5843,7 @@
 </p:notes>
 </file>
 
-<file path=ppt/notesSlides/notesSlide7.xml><?xml version="1.0" encoding="utf-8"?>
+<file path=ppt/notesSlides/notesSlide8.xml><?xml version="1.0" encoding="utf-8"?>
 <p:notes xmlns:a="http://schemas.openxmlformats.org/drawingml/2006/main" xmlns:r="http://schemas.openxmlformats.org/officeDocument/2006/relationships" xmlns:p="http://schemas.openxmlformats.org/presentationml/2006/main">
   <p:cSld>
     <p:spTree>
@@ -5618,7 +5933,7 @@
             <a:fld id="{22FC436C-5653-4517-9B94-0BB68ACE2454}" type="slidenum">
               <a:rPr lang="en-AU" smtClean="0"/>
               <a:pPr/>
-              <a:t>7</a:t>
+              <a:t>8</a:t>
             </a:fld>
             <a:endParaRPr lang="en-AU"/>
           </a:p>
@@ -5637,7 +5952,7 @@
 </p:notes>
 </file>
 
-<file path=ppt/notesSlides/notesSlide8.xml><?xml version="1.0" encoding="utf-8"?>
+<file path=ppt/notesSlides/notesSlide9.xml><?xml version="1.0" encoding="utf-8"?>
 <p:notes xmlns:a="http://schemas.openxmlformats.org/drawingml/2006/main" xmlns:r="http://schemas.openxmlformats.org/officeDocument/2006/relationships" xmlns:p="http://schemas.openxmlformats.org/presentationml/2006/main">
   <p:cSld>
     <p:spTree>
@@ -5760,7 +6075,7 @@
             <a:fld id="{22FC436C-5653-4517-9B94-0BB68ACE2454}" type="slidenum">
               <a:rPr lang="en-AU" smtClean="0"/>
               <a:pPr/>
-              <a:t>8</a:t>
+              <a:t>9</a:t>
             </a:fld>
             <a:endParaRPr lang="en-AU"/>
           </a:p>
@@ -5770,148 +6085,6 @@
     <p:extLst>
       <p:ext uri="{BB962C8B-B14F-4D97-AF65-F5344CB8AC3E}">
         <p14:creationId xmlns:p14="http://schemas.microsoft.com/office/powerpoint/2010/main" val="3504522948"/>
-      </p:ext>
-    </p:extLst>
-  </p:cSld>
-  <p:clrMapOvr>
-    <a:masterClrMapping/>
-  </p:clrMapOvr>
-</p:notes>
-</file>
-
-<file path=ppt/notesSlides/notesSlide9.xml><?xml version="1.0" encoding="utf-8"?>
-<p:notes xmlns:a="http://schemas.openxmlformats.org/drawingml/2006/main" xmlns:r="http://schemas.openxmlformats.org/officeDocument/2006/relationships" xmlns:p="http://schemas.openxmlformats.org/presentationml/2006/main">
-  <p:cSld>
-    <p:spTree>
-      <p:nvGrpSpPr>
-        <p:cNvPr id="1" name="">
-          <a:extLst>
-            <a:ext uri="{FF2B5EF4-FFF2-40B4-BE49-F238E27FC236}">
-              <a16:creationId xmlns:a16="http://schemas.microsoft.com/office/drawing/2014/main" id="{B48E2838-ED62-AB5F-EA86-BD364349DBA4}"/>
-            </a:ext>
-          </a:extLst>
-        </p:cNvPr>
-        <p:cNvGrpSpPr/>
-        <p:nvPr/>
-      </p:nvGrpSpPr>
-      <p:grpSpPr>
-        <a:xfrm>
-          <a:off x="0" y="0"/>
-          <a:ext cx="0" cy="0"/>
-          <a:chOff x="0" y="0"/>
-          <a:chExt cx="0" cy="0"/>
-        </a:xfrm>
-      </p:grpSpPr>
-      <p:sp>
-        <p:nvSpPr>
-          <p:cNvPr id="2" name="Slide Image Placeholder 1">
-            <a:extLst>
-              <a:ext uri="{FF2B5EF4-FFF2-40B4-BE49-F238E27FC236}">
-                <a16:creationId xmlns:a16="http://schemas.microsoft.com/office/drawing/2014/main" id="{14E0352C-AEFA-CEFF-50D5-A7925A902966}"/>
-              </a:ext>
-            </a:extLst>
-          </p:cNvPr>
-          <p:cNvSpPr>
-            <a:spLocks noGrp="1" noRot="1" noChangeAspect="1"/>
-          </p:cNvSpPr>
-          <p:nvPr>
-            <p:ph type="sldImg"/>
-          </p:nvPr>
-        </p:nvSpPr>
-        <p:spPr/>
-      </p:sp>
-      <p:sp>
-        <p:nvSpPr>
-          <p:cNvPr id="3" name="Notes Placeholder 2">
-            <a:extLst>
-              <a:ext uri="{FF2B5EF4-FFF2-40B4-BE49-F238E27FC236}">
-                <a16:creationId xmlns:a16="http://schemas.microsoft.com/office/drawing/2014/main" id="{CA309A9C-EA6D-C3D9-95F7-E9A707731467}"/>
-              </a:ext>
-            </a:extLst>
-          </p:cNvPr>
-          <p:cNvSpPr>
-            <a:spLocks noGrp="1"/>
-          </p:cNvSpPr>
-          <p:nvPr>
-            <p:ph type="body" idx="1"/>
-          </p:nvPr>
-        </p:nvSpPr>
-        <p:spPr/>
-        <p:txBody>
-          <a:bodyPr/>
-          <a:lstStyle/>
-          <a:p>
-            <a:r>
-              <a:rPr lang="en-AU" dirty="0"/>
-              <a:t>To sum up, our main contributions are:</a:t>
-            </a:r>
-          </a:p>
-          <a:p>
-            <a:endParaRPr lang="en-AU" dirty="0"/>
-          </a:p>
-          <a:p>
-            <a:pPr marL="228600" indent="-228600">
-              <a:buAutoNum type="arabicParenR"/>
-            </a:pPr>
-            <a:r>
-              <a:rPr lang="en-AU" dirty="0"/>
-              <a:t>A dynamic game theory model that allows for pre-commitment.</a:t>
-            </a:r>
-          </a:p>
-          <a:p>
-            <a:pPr marL="228600" indent="-228600">
-              <a:buAutoNum type="arabicParenR"/>
-            </a:pPr>
-            <a:r>
-              <a:rPr lang="en-AU" dirty="0"/>
-              <a:t>A discussion of how monetary fiscal conflict varies on the basis of supply vs demand shocks.</a:t>
-            </a:r>
-          </a:p>
-          <a:p>
-            <a:pPr marL="228600" indent="-228600">
-              <a:buAutoNum type="arabicParenR"/>
-            </a:pPr>
-            <a:r>
-              <a:rPr lang="en-AU" dirty="0"/>
-              <a:t>Endogenous determination of commitment regimes and their relation to social welfare.</a:t>
-            </a:r>
-          </a:p>
-        </p:txBody>
-      </p:sp>
-      <p:sp>
-        <p:nvSpPr>
-          <p:cNvPr id="4" name="Slide Number Placeholder 3">
-            <a:extLst>
-              <a:ext uri="{FF2B5EF4-FFF2-40B4-BE49-F238E27FC236}">
-                <a16:creationId xmlns:a16="http://schemas.microsoft.com/office/drawing/2014/main" id="{505DDC82-778A-08E9-1453-F98FAB7E9D13}"/>
-              </a:ext>
-            </a:extLst>
-          </p:cNvPr>
-          <p:cNvSpPr>
-            <a:spLocks noGrp="1"/>
-          </p:cNvSpPr>
-          <p:nvPr>
-            <p:ph type="sldNum" sz="quarter" idx="5"/>
-          </p:nvPr>
-        </p:nvSpPr>
-        <p:spPr/>
-        <p:txBody>
-          <a:bodyPr/>
-          <a:lstStyle/>
-          <a:p>
-            <a:fld id="{22FC436C-5653-4517-9B94-0BB68ACE2454}" type="slidenum">
-              <a:rPr lang="en-AU" smtClean="0"/>
-              <a:pPr/>
-              <a:t>9</a:t>
-            </a:fld>
-            <a:endParaRPr lang="en-AU"/>
-          </a:p>
-        </p:txBody>
-      </p:sp>
-    </p:spTree>
-    <p:extLst>
-      <p:ext uri="{BB962C8B-B14F-4D97-AF65-F5344CB8AC3E}">
-        <p14:creationId xmlns:p14="http://schemas.microsoft.com/office/powerpoint/2010/main" val="875647486"/>
       </p:ext>
     </p:extLst>
   </p:cSld>
@@ -7191,7 +7364,7 @@
           <a:p>
             <a:fld id="{A09C5C50-442C-4270-89D8-174894833343}" type="datetime1">
               <a:rPr lang="en-AU" smtClean="0"/>
-              <a:t>2/12/2024</a:t>
+              <a:t>5/12/2024</a:t>
             </a:fld>
             <a:endParaRPr lang="en-AU" dirty="0"/>
           </a:p>
@@ -9984,7 +10157,7 @@
           <a:p>
             <a:fld id="{A09C5C50-442C-4270-89D8-174894833343}" type="datetime1">
               <a:rPr lang="en-AU" smtClean="0"/>
-              <a:t>2/12/2024</a:t>
+              <a:t>5/12/2024</a:t>
             </a:fld>
             <a:endParaRPr lang="en-AU" dirty="0"/>
           </a:p>
@@ -10247,7 +10420,7 @@
           <a:p>
             <a:fld id="{A09C5C50-442C-4270-89D8-174894833343}" type="datetime1">
               <a:rPr lang="en-AU" smtClean="0"/>
-              <a:t>2/12/2024</a:t>
+              <a:t>5/12/2024</a:t>
             </a:fld>
             <a:endParaRPr lang="en-AU" dirty="0"/>
           </a:p>
@@ -10464,7 +10637,7 @@
           <a:p>
             <a:fld id="{A09C5C50-442C-4270-89D8-174894833343}" type="datetime1">
               <a:rPr lang="en-AU" smtClean="0"/>
-              <a:t>2/12/2024</a:t>
+              <a:t>5/12/2024</a:t>
             </a:fld>
             <a:endParaRPr lang="en-AU" dirty="0"/>
           </a:p>
@@ -10940,7 +11113,7 @@
           <a:p>
             <a:fld id="{A09C5C50-442C-4270-89D8-174894833343}" type="datetime1">
               <a:rPr lang="en-AU" smtClean="0"/>
-              <a:t>2/12/2024</a:t>
+              <a:t>5/12/2024</a:t>
             </a:fld>
             <a:endParaRPr lang="en-AU" dirty="0"/>
           </a:p>
@@ -11301,7 +11474,7 @@
           <a:p>
             <a:fld id="{A09C5C50-442C-4270-89D8-174894833343}" type="datetime1">
               <a:rPr lang="en-AU" smtClean="0"/>
-              <a:t>2/12/2024</a:t>
+              <a:t>5/12/2024</a:t>
             </a:fld>
             <a:endParaRPr lang="en-AU" dirty="0"/>
           </a:p>
@@ -11798,7 +11971,7 @@
           <a:p>
             <a:fld id="{A09C5C50-442C-4270-89D8-174894833343}" type="datetime1">
               <a:rPr lang="en-AU" smtClean="0"/>
-              <a:t>2/12/2024</a:t>
+              <a:t>5/12/2024</a:t>
             </a:fld>
             <a:endParaRPr lang="en-AU" dirty="0"/>
           </a:p>
@@ -12461,7 +12634,7 @@
           <a:p>
             <a:fld id="{A09C5C50-442C-4270-89D8-174894833343}" type="datetime1">
               <a:rPr lang="en-AU" smtClean="0"/>
-              <a:t>2/12/2024</a:t>
+              <a:t>5/12/2024</a:t>
             </a:fld>
             <a:endParaRPr lang="en-AU" dirty="0"/>
           </a:p>
@@ -12631,7 +12804,7 @@
           <a:p>
             <a:fld id="{A09C5C50-442C-4270-89D8-174894833343}" type="datetime1">
               <a:rPr lang="en-AU" smtClean="0"/>
-              <a:t>2/12/2024</a:t>
+              <a:t>5/12/2024</a:t>
             </a:fld>
             <a:endParaRPr lang="en-AU" dirty="0"/>
           </a:p>
@@ -12818,7 +12991,7 @@
           <a:p>
             <a:fld id="{A09C5C50-442C-4270-89D8-174894833343}" type="datetime1">
               <a:rPr lang="en-AU" smtClean="0"/>
-              <a:t>2/12/2024</a:t>
+              <a:t>5/12/2024</a:t>
             </a:fld>
             <a:endParaRPr lang="en-AU" dirty="0"/>
           </a:p>
@@ -13090,7 +13263,7 @@
           <a:p>
             <a:fld id="{A09C5C50-442C-4270-89D8-174894833343}" type="datetime1">
               <a:rPr lang="en-AU" smtClean="0"/>
-              <a:t>2/12/2024</a:t>
+              <a:t>5/12/2024</a:t>
             </a:fld>
             <a:endParaRPr lang="en-AU" dirty="0"/>
           </a:p>
@@ -13969,6 +14142,152 @@
 </file>
 
 <file path=ppt/slides/slide10.xml><?xml version="1.0" encoding="utf-8"?>
+<p:sld xmlns:a="http://schemas.openxmlformats.org/drawingml/2006/main" xmlns:r="http://schemas.openxmlformats.org/officeDocument/2006/relationships" xmlns:p="http://schemas.openxmlformats.org/presentationml/2006/main">
+  <p:cSld>
+    <p:spTree>
+      <p:nvGrpSpPr>
+        <p:cNvPr id="1" name="">
+          <a:extLst>
+            <a:ext uri="{FF2B5EF4-FFF2-40B4-BE49-F238E27FC236}">
+              <a16:creationId xmlns:a16="http://schemas.microsoft.com/office/drawing/2014/main" id="{731DA61C-EB86-E9DA-0BE9-7D651B82E42C}"/>
+            </a:ext>
+          </a:extLst>
+        </p:cNvPr>
+        <p:cNvGrpSpPr/>
+        <p:nvPr/>
+      </p:nvGrpSpPr>
+      <p:grpSpPr>
+        <a:xfrm>
+          <a:off x="0" y="0"/>
+          <a:ext cx="0" cy="0"/>
+          <a:chOff x="0" y="0"/>
+          <a:chExt cx="0" cy="0"/>
+        </a:xfrm>
+      </p:grpSpPr>
+      <p:sp>
+        <p:nvSpPr>
+          <p:cNvPr id="2" name="Title 1">
+            <a:extLst>
+              <a:ext uri="{FF2B5EF4-FFF2-40B4-BE49-F238E27FC236}">
+                <a16:creationId xmlns:a16="http://schemas.microsoft.com/office/drawing/2014/main" id="{55C82006-C035-E4A8-BFF2-179007CFBE49}"/>
+              </a:ext>
+            </a:extLst>
+          </p:cNvPr>
+          <p:cNvSpPr>
+            <a:spLocks noGrp="1"/>
+          </p:cNvSpPr>
+          <p:nvPr>
+            <p:ph type="title"/>
+          </p:nvPr>
+        </p:nvSpPr>
+        <p:spPr/>
+        <p:txBody>
+          <a:bodyPr/>
+          <a:lstStyle/>
+          <a:p>
+            <a:r>
+              <a:rPr lang="en-AU" dirty="0"/>
+              <a:t>Key pieces</a:t>
+            </a:r>
+          </a:p>
+        </p:txBody>
+      </p:sp>
+      <p:sp>
+        <p:nvSpPr>
+          <p:cNvPr id="3" name="Content Placeholder 2">
+            <a:extLst>
+              <a:ext uri="{FF2B5EF4-FFF2-40B4-BE49-F238E27FC236}">
+                <a16:creationId xmlns:a16="http://schemas.microsoft.com/office/drawing/2014/main" id="{7F6F0124-6AB2-AD3C-994C-184C7536A033}"/>
+              </a:ext>
+            </a:extLst>
+          </p:cNvPr>
+          <p:cNvSpPr>
+            <a:spLocks noGrp="1"/>
+          </p:cNvSpPr>
+          <p:nvPr>
+            <p:ph sz="half" idx="1"/>
+          </p:nvPr>
+        </p:nvSpPr>
+        <p:spPr>
+          <a:xfrm>
+            <a:off x="390364" y="771550"/>
+            <a:ext cx="8363272" cy="4104456"/>
+          </a:xfrm>
+        </p:spPr>
+        <p:txBody>
+          <a:bodyPr>
+            <a:normAutofit/>
+          </a:bodyPr>
+          <a:lstStyle/>
+          <a:p>
+            <a:pPr marL="0" indent="0">
+              <a:buNone/>
+            </a:pPr>
+            <a:r>
+              <a:rPr lang="en-AU" dirty="0"/>
+              <a:t>Adjustment costs of changing policy instruments.</a:t>
+            </a:r>
+          </a:p>
+          <a:p>
+            <a:r>
+              <a:rPr lang="en-AU" dirty="0"/>
+              <a:t>XXX</a:t>
+            </a:r>
+          </a:p>
+          <a:p>
+            <a:r>
+              <a:rPr lang="en-AU" dirty="0"/>
+              <a:t>XXX</a:t>
+            </a:r>
+          </a:p>
+          <a:p>
+            <a:endParaRPr lang="en-AU" dirty="0"/>
+          </a:p>
+          <a:p>
+            <a:endParaRPr lang="en-AU" dirty="0"/>
+          </a:p>
+          <a:p>
+            <a:endParaRPr lang="en-AU" dirty="0"/>
+          </a:p>
+          <a:p>
+            <a:pPr marL="0" indent="0">
+              <a:buNone/>
+            </a:pPr>
+            <a:r>
+              <a:rPr lang="en-AU" dirty="0"/>
+              <a:t>Dynamic oligopoly models and </a:t>
+            </a:r>
+            <a:r>
+              <a:rPr lang="en-AU" dirty="0" err="1"/>
+              <a:t>supermodularity</a:t>
+            </a:r>
+            <a:r>
+              <a:rPr lang="en-AU" dirty="0"/>
+              <a:t>.</a:t>
+            </a:r>
+          </a:p>
+          <a:p>
+            <a:r>
+              <a:rPr lang="en-US" dirty="0"/>
+              <a:t>XXX</a:t>
+            </a:r>
+          </a:p>
+        </p:txBody>
+      </p:sp>
+    </p:spTree>
+    <p:extLst>
+      <p:ext uri="{BB962C8B-B14F-4D97-AF65-F5344CB8AC3E}">
+        <p14:creationId xmlns:p14="http://schemas.microsoft.com/office/powerpoint/2010/main" val="3486791445"/>
+      </p:ext>
+    </p:extLst>
+  </p:cSld>
+  <p:clrMapOvr>
+    <a:masterClrMapping/>
+  </p:clrMapOvr>
+</p:sld>
+</file>
+
+<file path=ppt/slides/slide11.xml><?xml version="1.0" encoding="utf-8"?>
 <p:sld xmlns:a="http://schemas.openxmlformats.org/drawingml/2006/main" xmlns:r="http://schemas.openxmlformats.org/officeDocument/2006/relationships" xmlns:p="http://schemas.openxmlformats.org/presentationml/2006/main">
   <p:cSld>
     <p:spTree>
@@ -14501,7 +14820,7 @@
 </p:sld>
 </file>
 
-<file path=ppt/slides/slide11.xml><?xml version="1.0" encoding="utf-8"?>
+<file path=ppt/slides/slide12.xml><?xml version="1.0" encoding="utf-8"?>
 <p:sld xmlns:a="http://schemas.openxmlformats.org/drawingml/2006/main" xmlns:r="http://schemas.openxmlformats.org/officeDocument/2006/relationships" xmlns:p="http://schemas.openxmlformats.org/presentationml/2006/main">
   <p:cSld>
     <p:spTree>
@@ -16680,7 +16999,7 @@
 </p:sld>
 </file>
 
-<file path=ppt/slides/slide12.xml><?xml version="1.0" encoding="utf-8"?>
+<file path=ppt/slides/slide13.xml><?xml version="1.0" encoding="utf-8"?>
 <p:sld xmlns:a="http://schemas.openxmlformats.org/drawingml/2006/main" xmlns:r="http://schemas.openxmlformats.org/officeDocument/2006/relationships" xmlns:p="http://schemas.openxmlformats.org/presentationml/2006/main">
   <p:cSld>
     <p:spTree>
@@ -16782,7 +17101,7 @@
 </p:sld>
 </file>
 
-<file path=ppt/slides/slide13.xml><?xml version="1.0" encoding="utf-8"?>
+<file path=ppt/slides/slide14.xml><?xml version="1.0" encoding="utf-8"?>
 <p:sld xmlns:a="http://schemas.openxmlformats.org/drawingml/2006/main" xmlns:r="http://schemas.openxmlformats.org/officeDocument/2006/relationships" xmlns:p="http://schemas.openxmlformats.org/presentationml/2006/main">
   <p:cSld>
     <p:spTree>
@@ -16827,8 +17146,8 @@
           </a:p>
         </p:txBody>
       </p:sp>
-      <mc:AlternateContent xmlns:mc="http://schemas.openxmlformats.org/markup-compatibility/2006">
-        <mc:Choice xmlns:a14="http://schemas.microsoft.com/office/drawing/2010/main" Requires="a14">
+      <mc:AlternateContent xmlns:mc="http://schemas.openxmlformats.org/markup-compatibility/2006" xmlns:a14="http://schemas.microsoft.com/office/drawing/2010/main">
+        <mc:Choice Requires="a14">
           <p:sp>
             <p:nvSpPr>
               <p:cNvPr id="3" name="Content Placeholder 2">
@@ -18023,7 +18342,7 @@
             </p:txBody>
           </p:sp>
         </mc:Choice>
-        <mc:Fallback>
+        <mc:Fallback xmlns="">
           <p:sp>
             <p:nvSpPr>
               <p:cNvPr id="3" name="Content Placeholder 2">
@@ -18080,7 +18399,7 @@
 </p:sld>
 </file>
 
-<file path=ppt/slides/slide14.xml><?xml version="1.0" encoding="utf-8"?>
+<file path=ppt/slides/slide15.xml><?xml version="1.0" encoding="utf-8"?>
 <p:sld xmlns:a="http://schemas.openxmlformats.org/drawingml/2006/main" xmlns:r="http://schemas.openxmlformats.org/officeDocument/2006/relationships" xmlns:p="http://schemas.openxmlformats.org/presentationml/2006/main">
   <p:cSld>
     <p:spTree>
@@ -18196,7 +18515,7 @@
 </p:sld>
 </file>
 
-<file path=ppt/slides/slide15.xml><?xml version="1.0" encoding="utf-8"?>
+<file path=ppt/slides/slide16.xml><?xml version="1.0" encoding="utf-8"?>
 <p:sld xmlns:a="http://schemas.openxmlformats.org/drawingml/2006/main" xmlns:r="http://schemas.openxmlformats.org/officeDocument/2006/relationships" xmlns:p="http://schemas.openxmlformats.org/presentationml/2006/main">
   <p:cSld>
     <p:spTree>
@@ -18312,7 +18631,7 @@
 </p:sld>
 </file>
 
-<file path=ppt/slides/slide16.xml><?xml version="1.0" encoding="utf-8"?>
+<file path=ppt/slides/slide17.xml><?xml version="1.0" encoding="utf-8"?>
 <p:sld xmlns:a="http://schemas.openxmlformats.org/drawingml/2006/main" xmlns:r="http://schemas.openxmlformats.org/officeDocument/2006/relationships" xmlns:p="http://schemas.openxmlformats.org/presentationml/2006/main">
   <p:cSld>
     <p:spTree>
@@ -18510,7 +18829,7 @@
 </p:sld>
 </file>
 
-<file path=ppt/slides/slide17.xml><?xml version="1.0" encoding="utf-8"?>
+<file path=ppt/slides/slide18.xml><?xml version="1.0" encoding="utf-8"?>
 <p:sld xmlns:a="http://schemas.openxmlformats.org/drawingml/2006/main" xmlns:r="http://schemas.openxmlformats.org/officeDocument/2006/relationships" xmlns:p="http://schemas.openxmlformats.org/presentationml/2006/main">
   <p:cSld>
     <p:spTree>
@@ -19831,7 +20150,7 @@
 </p:sld>
 </file>
 
-<file path=ppt/slides/slide18.xml><?xml version="1.0" encoding="utf-8"?>
+<file path=ppt/slides/slide19.xml><?xml version="1.0" encoding="utf-8"?>
 <p:sld xmlns:a="http://schemas.openxmlformats.org/drawingml/2006/main" xmlns:r="http://schemas.openxmlformats.org/officeDocument/2006/relationships" xmlns:p="http://schemas.openxmlformats.org/presentationml/2006/main">
   <p:cSld>
     <p:spTree>
@@ -20783,70 +21102,6 @@
 </p:sld>
 </file>
 
-<file path=ppt/slides/slide19.xml><?xml version="1.0" encoding="utf-8"?>
-<p:sld xmlns:a="http://schemas.openxmlformats.org/drawingml/2006/main" xmlns:r="http://schemas.openxmlformats.org/officeDocument/2006/relationships" xmlns:p="http://schemas.openxmlformats.org/presentationml/2006/main">
-  <p:cSld>
-    <p:spTree>
-      <p:nvGrpSpPr>
-        <p:cNvPr id="1" name="">
-          <a:extLst>
-            <a:ext uri="{FF2B5EF4-FFF2-40B4-BE49-F238E27FC236}">
-              <a16:creationId xmlns:a16="http://schemas.microsoft.com/office/drawing/2014/main" id="{F3621351-CCAB-7DBA-24FF-15352F5013EA}"/>
-            </a:ext>
-          </a:extLst>
-        </p:cNvPr>
-        <p:cNvGrpSpPr/>
-        <p:nvPr/>
-      </p:nvGrpSpPr>
-      <p:grpSpPr>
-        <a:xfrm>
-          <a:off x="0" y="0"/>
-          <a:ext cx="0" cy="0"/>
-          <a:chOff x="0" y="0"/>
-          <a:chExt cx="0" cy="0"/>
-        </a:xfrm>
-      </p:grpSpPr>
-      <p:sp>
-        <p:nvSpPr>
-          <p:cNvPr id="2" name="Title 1">
-            <a:extLst>
-              <a:ext uri="{FF2B5EF4-FFF2-40B4-BE49-F238E27FC236}">
-                <a16:creationId xmlns:a16="http://schemas.microsoft.com/office/drawing/2014/main" id="{06671A26-84F7-EF09-04E1-6FC01453961B}"/>
-              </a:ext>
-            </a:extLst>
-          </p:cNvPr>
-          <p:cNvSpPr>
-            <a:spLocks noGrp="1"/>
-          </p:cNvSpPr>
-          <p:nvPr>
-            <p:ph type="title"/>
-          </p:nvPr>
-        </p:nvSpPr>
-        <p:spPr/>
-        <p:txBody>
-          <a:bodyPr/>
-          <a:lstStyle/>
-          <a:p>
-            <a:r>
-              <a:rPr lang="en-AU" dirty="0"/>
-              <a:t>Dynamic game with “insufficient demand”</a:t>
-            </a:r>
-          </a:p>
-        </p:txBody>
-      </p:sp>
-    </p:spTree>
-    <p:extLst>
-      <p:ext uri="{BB962C8B-B14F-4D97-AF65-F5344CB8AC3E}">
-        <p14:creationId xmlns:p14="http://schemas.microsoft.com/office/powerpoint/2010/main" val="2407331509"/>
-      </p:ext>
-    </p:extLst>
-  </p:cSld>
-  <p:clrMapOvr>
-    <a:masterClrMapping/>
-  </p:clrMapOvr>
-</p:sld>
-</file>
-
 <file path=ppt/slides/slide2.xml><?xml version="1.0" encoding="utf-8"?>
 <p:sld xmlns:a="http://schemas.openxmlformats.org/drawingml/2006/main" xmlns:r="http://schemas.openxmlformats.org/officeDocument/2006/relationships" xmlns:p="http://schemas.openxmlformats.org/presentationml/2006/main">
   <p:cSld>
@@ -21015,6 +21270,70 @@
         <p:cNvPr id="1" name="">
           <a:extLst>
             <a:ext uri="{FF2B5EF4-FFF2-40B4-BE49-F238E27FC236}">
+              <a16:creationId xmlns:a16="http://schemas.microsoft.com/office/drawing/2014/main" id="{F3621351-CCAB-7DBA-24FF-15352F5013EA}"/>
+            </a:ext>
+          </a:extLst>
+        </p:cNvPr>
+        <p:cNvGrpSpPr/>
+        <p:nvPr/>
+      </p:nvGrpSpPr>
+      <p:grpSpPr>
+        <a:xfrm>
+          <a:off x="0" y="0"/>
+          <a:ext cx="0" cy="0"/>
+          <a:chOff x="0" y="0"/>
+          <a:chExt cx="0" cy="0"/>
+        </a:xfrm>
+      </p:grpSpPr>
+      <p:sp>
+        <p:nvSpPr>
+          <p:cNvPr id="2" name="Title 1">
+            <a:extLst>
+              <a:ext uri="{FF2B5EF4-FFF2-40B4-BE49-F238E27FC236}">
+                <a16:creationId xmlns:a16="http://schemas.microsoft.com/office/drawing/2014/main" id="{06671A26-84F7-EF09-04E1-6FC01453961B}"/>
+              </a:ext>
+            </a:extLst>
+          </p:cNvPr>
+          <p:cNvSpPr>
+            <a:spLocks noGrp="1"/>
+          </p:cNvSpPr>
+          <p:nvPr>
+            <p:ph type="title"/>
+          </p:nvPr>
+        </p:nvSpPr>
+        <p:spPr/>
+        <p:txBody>
+          <a:bodyPr/>
+          <a:lstStyle/>
+          <a:p>
+            <a:r>
+              <a:rPr lang="en-AU" dirty="0"/>
+              <a:t>Dynamic game with “insufficient demand”</a:t>
+            </a:r>
+          </a:p>
+        </p:txBody>
+      </p:sp>
+    </p:spTree>
+    <p:extLst>
+      <p:ext uri="{BB962C8B-B14F-4D97-AF65-F5344CB8AC3E}">
+        <p14:creationId xmlns:p14="http://schemas.microsoft.com/office/powerpoint/2010/main" val="2407331509"/>
+      </p:ext>
+    </p:extLst>
+  </p:cSld>
+  <p:clrMapOvr>
+    <a:masterClrMapping/>
+  </p:clrMapOvr>
+</p:sld>
+</file>
+
+<file path=ppt/slides/slide21.xml><?xml version="1.0" encoding="utf-8"?>
+<p:sld xmlns:a="http://schemas.openxmlformats.org/drawingml/2006/main" xmlns:r="http://schemas.openxmlformats.org/officeDocument/2006/relationships" xmlns:p="http://schemas.openxmlformats.org/presentationml/2006/main">
+  <p:cSld>
+    <p:spTree>
+      <p:nvGrpSpPr>
+        <p:cNvPr id="1" name="">
+          <a:extLst>
+            <a:ext uri="{FF2B5EF4-FFF2-40B4-BE49-F238E27FC236}">
               <a16:creationId xmlns:a16="http://schemas.microsoft.com/office/drawing/2014/main" id="{B286DE15-18B2-771F-78AF-3CBE13A026F4}"/>
             </a:ext>
           </a:extLst>
@@ -21076,7 +21395,7 @@
 </p:sld>
 </file>
 
-<file path=ppt/slides/slide21.xml><?xml version="1.0" encoding="utf-8"?>
+<file path=ppt/slides/slide22.xml><?xml version="1.0" encoding="utf-8"?>
 <p:sld xmlns:a="http://schemas.openxmlformats.org/drawingml/2006/main" xmlns:r="http://schemas.openxmlformats.org/officeDocument/2006/relationships" xmlns:p="http://schemas.openxmlformats.org/presentationml/2006/main">
   <p:cSld>
     <p:spTree>
@@ -21331,7 +21650,7 @@
 </p:sld>
 </file>
 
-<file path=ppt/slides/slide22.xml><?xml version="1.0" encoding="utf-8"?>
+<file path=ppt/slides/slide23.xml><?xml version="1.0" encoding="utf-8"?>
 <p:sld xmlns:a="http://schemas.openxmlformats.org/drawingml/2006/main" xmlns:r="http://schemas.openxmlformats.org/officeDocument/2006/relationships" xmlns:p="http://schemas.openxmlformats.org/presentationml/2006/main">
   <p:cSld>
     <p:spTree>
@@ -21433,7 +21752,7 @@
 </p:sld>
 </file>
 
-<file path=ppt/slides/slide23.xml><?xml version="1.0" encoding="utf-8"?>
+<file path=ppt/slides/slide24.xml><?xml version="1.0" encoding="utf-8"?>
 <p:sld xmlns:a="http://schemas.openxmlformats.org/drawingml/2006/main" xmlns:r="http://schemas.openxmlformats.org/officeDocument/2006/relationships" xmlns:p="http://schemas.openxmlformats.org/presentationml/2006/main">
   <p:cSld>
     <p:spTree>
@@ -21478,8 +21797,8 @@
           </a:p>
         </p:txBody>
       </p:sp>
-      <mc:AlternateContent xmlns:mc="http://schemas.openxmlformats.org/markup-compatibility/2006">
-        <mc:Choice xmlns:a14="http://schemas.microsoft.com/office/drawing/2010/main" Requires="a14">
+      <mc:AlternateContent xmlns:mc="http://schemas.openxmlformats.org/markup-compatibility/2006" xmlns:a14="http://schemas.microsoft.com/office/drawing/2010/main">
+        <mc:Choice Requires="a14">
           <p:sp>
             <p:nvSpPr>
               <p:cNvPr id="3" name="Content Placeholder 2">
@@ -22613,7 +22932,7 @@
             </p:txBody>
           </p:sp>
         </mc:Choice>
-        <mc:Fallback>
+        <mc:Fallback xmlns="">
           <p:sp>
             <p:nvSpPr>
               <p:cNvPr id="3" name="Content Placeholder 2">
@@ -22670,7 +22989,7 @@
 </p:sld>
 </file>
 
-<file path=ppt/slides/slide24.xml><?xml version="1.0" encoding="utf-8"?>
+<file path=ppt/slides/slide25.xml><?xml version="1.0" encoding="utf-8"?>
 <p:sld xmlns:a="http://schemas.openxmlformats.org/drawingml/2006/main" xmlns:r="http://schemas.openxmlformats.org/officeDocument/2006/relationships" xmlns:p="http://schemas.openxmlformats.org/presentationml/2006/main">
   <p:cSld>
     <p:spTree>
@@ -22786,7 +23105,7 @@
 </p:sld>
 </file>
 
-<file path=ppt/slides/slide25.xml><?xml version="1.0" encoding="utf-8"?>
+<file path=ppt/slides/slide26.xml><?xml version="1.0" encoding="utf-8"?>
 <p:sld xmlns:a="http://schemas.openxmlformats.org/drawingml/2006/main" xmlns:r="http://schemas.openxmlformats.org/officeDocument/2006/relationships" xmlns:p="http://schemas.openxmlformats.org/presentationml/2006/main">
   <p:cSld>
     <p:spTree>
@@ -22907,7 +23226,7 @@
 </p:sld>
 </file>
 
-<file path=ppt/slides/slide26.xml><?xml version="1.0" encoding="utf-8"?>
+<file path=ppt/slides/slide27.xml><?xml version="1.0" encoding="utf-8"?>
 <p:sld xmlns:a="http://schemas.openxmlformats.org/drawingml/2006/main" xmlns:r="http://schemas.openxmlformats.org/officeDocument/2006/relationships" xmlns:p="http://schemas.openxmlformats.org/presentationml/2006/main">
   <p:cSld>
     <p:spTree>
@@ -23090,7 +23409,7 @@
         </p:spPr>
         <p:txBody>
           <a:bodyPr>
-            <a:normAutofit/>
+            <a:normAutofit fontScale="85000" lnSpcReduction="20000"/>
           </a:bodyPr>
           <a:lstStyle/>
           <a:p>
@@ -23121,19 +23440,67 @@
             <a:endParaRPr lang="en-AU" dirty="0"/>
           </a:p>
           <a:p>
-            <a:r>
-              <a:rPr lang="en-AU" dirty="0"/>
-              <a:t>Both scenarios suggest that fiscal and monetary authorities may have been engaged in a non-cooperative game.</a:t>
-            </a:r>
-          </a:p>
-          <a:p>
+            <a:pPr marL="0" indent="0">
+              <a:buNone/>
+            </a:pPr>
+            <a:r>
+              <a:rPr lang="en-AU" sz="1800" i="1" dirty="0">
+                <a:effectLst/>
+                <a:latin typeface="Calibri" panose="020F0502020204030204" pitchFamily="34" charset="0"/>
+                <a:ea typeface="Calibri" panose="020F0502020204030204" pitchFamily="34" charset="0"/>
+              </a:rPr>
+              <a:t>“[I]t is important to recognize that the role of an independent central bank is different in inflationary and deflationary environments. In the face of inflation, which is often associated with excessive monetization of government debt, the virtue of an independent central bank is its ability to say ‘no’ to the government. With protracted deflation, however, excessive money creation is unlikely to be the problem, and a more cooperative stance on the part of the central bank may be called for. Under [these] circumstances, greater cooperation for a time between [central banks] and fiscal authorities is in no way inconsistent with the independence of the central banks, any more than cooperation between two independent nations in pursuit of a common objective is inconsistent with the principle of national sovereignty.”</a:t>
+            </a:r>
+            <a:endParaRPr lang="en-NZ" sz="1800" dirty="0">
+              <a:effectLst/>
+              <a:latin typeface="Calibri" panose="020F0502020204030204" pitchFamily="34" charset="0"/>
+              <a:ea typeface="Calibri" panose="020F0502020204030204" pitchFamily="34" charset="0"/>
+            </a:endParaRPr>
+          </a:p>
+          <a:p>
+            <a:pPr marL="0" indent="0">
+              <a:buNone/>
+            </a:pPr>
+            <a:r>
+              <a:rPr lang="en-AU" sz="1800" i="1" dirty="0">
+                <a:effectLst/>
+                <a:latin typeface="Calibri" panose="020F0502020204030204" pitchFamily="34" charset="0"/>
+                <a:ea typeface="Calibri" panose="020F0502020204030204" pitchFamily="34" charset="0"/>
+              </a:rPr>
+              <a:t> </a:t>
+            </a:r>
+            <a:endParaRPr lang="en-NZ" sz="1800" dirty="0">
+              <a:effectLst/>
+              <a:latin typeface="Calibri" panose="020F0502020204030204" pitchFamily="34" charset="0"/>
+              <a:ea typeface="Calibri" panose="020F0502020204030204" pitchFamily="34" charset="0"/>
+            </a:endParaRPr>
+          </a:p>
+          <a:p>
+            <a:pPr marL="0" indent="0">
+              <a:buNone/>
+            </a:pPr>
+            <a:r>
+              <a:rPr lang="en-AU" sz="1800" dirty="0">
+                <a:effectLst/>
+                <a:latin typeface="Calibri" panose="020F0502020204030204" pitchFamily="34" charset="0"/>
+                <a:ea typeface="Calibri" panose="020F0502020204030204" pitchFamily="34" charset="0"/>
+              </a:rPr>
+              <a:t>Ben Bernanke, Chairman of the Board of Governors of the Federal reserve, before the Japan Society of Monetary Economics, Tokyo, Japan, May 31, 2003.</a:t>
+            </a:r>
+            <a:endParaRPr lang="en-NZ" sz="1800" dirty="0">
+              <a:effectLst/>
+              <a:latin typeface="Calibri" panose="020F0502020204030204" pitchFamily="34" charset="0"/>
+              <a:ea typeface="Calibri" panose="020F0502020204030204" pitchFamily="34" charset="0"/>
+            </a:endParaRPr>
+          </a:p>
+          <a:p>
+            <a:pPr marL="0" indent="0">
+              <a:buNone/>
+            </a:pPr>
             <a:endParaRPr lang="en-AU" dirty="0"/>
           </a:p>
           <a:p>
-            <a:r>
-              <a:rPr lang="en-AU" dirty="0"/>
-              <a:t>Has growing policy stickiness (pre-commitment) exacerbated this game? Does the type of shock matter?</a:t>
-            </a:r>
+            <a:endParaRPr lang="en-AU" dirty="0"/>
           </a:p>
           <a:p>
             <a:endParaRPr lang="en-AU" dirty="0"/>
@@ -23154,6 +23521,173 @@
 </file>
 
 <file path=ppt/slides/slide4.xml><?xml version="1.0" encoding="utf-8"?>
+<p:sld xmlns:a="http://schemas.openxmlformats.org/drawingml/2006/main" xmlns:r="http://schemas.openxmlformats.org/officeDocument/2006/relationships" xmlns:p="http://schemas.openxmlformats.org/presentationml/2006/main">
+  <p:cSld>
+    <p:spTree>
+      <p:nvGrpSpPr>
+        <p:cNvPr id="1" name="">
+          <a:extLst>
+            <a:ext uri="{FF2B5EF4-FFF2-40B4-BE49-F238E27FC236}">
+              <a16:creationId xmlns:a16="http://schemas.microsoft.com/office/drawing/2014/main" id="{4F08F8BA-F6AE-01FC-76D3-5A22490DECD1}"/>
+            </a:ext>
+          </a:extLst>
+        </p:cNvPr>
+        <p:cNvGrpSpPr/>
+        <p:nvPr/>
+      </p:nvGrpSpPr>
+      <p:grpSpPr>
+        <a:xfrm>
+          <a:off x="0" y="0"/>
+          <a:ext cx="0" cy="0"/>
+          <a:chOff x="0" y="0"/>
+          <a:chExt cx="0" cy="0"/>
+        </a:xfrm>
+      </p:grpSpPr>
+      <p:sp>
+        <p:nvSpPr>
+          <p:cNvPr id="2" name="Title 1">
+            <a:extLst>
+              <a:ext uri="{FF2B5EF4-FFF2-40B4-BE49-F238E27FC236}">
+                <a16:creationId xmlns:a16="http://schemas.microsoft.com/office/drawing/2014/main" id="{6EDF7799-8D63-8F54-E768-C6A16CCBB2BF}"/>
+              </a:ext>
+            </a:extLst>
+          </p:cNvPr>
+          <p:cNvSpPr>
+            <a:spLocks noGrp="1"/>
+          </p:cNvSpPr>
+          <p:nvPr>
+            <p:ph type="title"/>
+          </p:nvPr>
+        </p:nvSpPr>
+        <p:spPr/>
+        <p:txBody>
+          <a:bodyPr/>
+          <a:lstStyle/>
+          <a:p>
+            <a:r>
+              <a:rPr lang="en-AU" dirty="0"/>
+              <a:t>Motivation</a:t>
+            </a:r>
+          </a:p>
+        </p:txBody>
+      </p:sp>
+      <p:sp>
+        <p:nvSpPr>
+          <p:cNvPr id="3" name="Content Placeholder 2">
+            <a:extLst>
+              <a:ext uri="{FF2B5EF4-FFF2-40B4-BE49-F238E27FC236}">
+                <a16:creationId xmlns:a16="http://schemas.microsoft.com/office/drawing/2014/main" id="{0230EFD6-D29D-83CA-6DDD-2B8AB8DFB73C}"/>
+              </a:ext>
+            </a:extLst>
+          </p:cNvPr>
+          <p:cNvSpPr>
+            <a:spLocks noGrp="1"/>
+          </p:cNvSpPr>
+          <p:nvPr>
+            <p:ph sz="half" idx="1"/>
+          </p:nvPr>
+        </p:nvSpPr>
+        <p:spPr>
+          <a:xfrm>
+            <a:off x="313184" y="820588"/>
+            <a:ext cx="8521254" cy="4127425"/>
+          </a:xfrm>
+        </p:spPr>
+        <p:txBody>
+          <a:bodyPr>
+            <a:normAutofit/>
+          </a:bodyPr>
+          <a:lstStyle/>
+          <a:p>
+            <a:r>
+              <a:rPr lang="en-AU" dirty="0">
+                <a:solidFill>
+                  <a:srgbClr val="C2C2C2"/>
+                </a:solidFill>
+              </a:rPr>
+              <a:t>Why does this matter?</a:t>
+            </a:r>
+          </a:p>
+          <a:p>
+            <a:endParaRPr lang="en-AU" dirty="0">
+              <a:solidFill>
+                <a:srgbClr val="C2C2C2"/>
+              </a:solidFill>
+            </a:endParaRPr>
+          </a:p>
+          <a:p>
+            <a:r>
+              <a:rPr lang="en-AU" dirty="0">
+                <a:solidFill>
+                  <a:srgbClr val="C2C2C2"/>
+                </a:solidFill>
+              </a:rPr>
+              <a:t>Insufficient stimulus post-GFC.</a:t>
+            </a:r>
+          </a:p>
+          <a:p>
+            <a:endParaRPr lang="en-AU" dirty="0">
+              <a:solidFill>
+                <a:srgbClr val="C2C2C2"/>
+              </a:solidFill>
+            </a:endParaRPr>
+          </a:p>
+          <a:p>
+            <a:r>
+              <a:rPr lang="en-AU" dirty="0">
+                <a:solidFill>
+                  <a:srgbClr val="C2C2C2"/>
+                </a:solidFill>
+              </a:rPr>
+              <a:t>Excessive stimulus post-COVID.</a:t>
+            </a:r>
+          </a:p>
+          <a:p>
+            <a:endParaRPr lang="en-AU" dirty="0"/>
+          </a:p>
+          <a:p>
+            <a:r>
+              <a:rPr lang="en-AU" sz="1800" dirty="0"/>
+              <a:t>Both scenarios suggest that fiscal and monetary authorities may have been engaged in a non-cooperative game – and the differences in these games give important clues about how to cooperate with different shocks.</a:t>
+            </a:r>
+          </a:p>
+          <a:p>
+            <a:endParaRPr lang="en-AU" sz="1800" dirty="0"/>
+          </a:p>
+          <a:p>
+            <a:r>
+              <a:rPr lang="en-AU" sz="1800" dirty="0"/>
+              <a:t>Policy stickiness/commitment is key:  Has growing policy stickiness (pre-commitment) exacerbated this game? Does the type of shock matter?</a:t>
+            </a:r>
+          </a:p>
+          <a:p>
+            <a:pPr marL="0" indent="0">
+              <a:buNone/>
+            </a:pPr>
+            <a:endParaRPr lang="en-AU" dirty="0"/>
+          </a:p>
+          <a:p>
+            <a:endParaRPr lang="en-AU" dirty="0"/>
+          </a:p>
+          <a:p>
+            <a:endParaRPr lang="en-AU" dirty="0"/>
+          </a:p>
+        </p:txBody>
+      </p:sp>
+    </p:spTree>
+    <p:extLst>
+      <p:ext uri="{BB962C8B-B14F-4D97-AF65-F5344CB8AC3E}">
+        <p14:creationId xmlns:p14="http://schemas.microsoft.com/office/powerpoint/2010/main" val="4146578943"/>
+      </p:ext>
+    </p:extLst>
+  </p:cSld>
+  <p:clrMapOvr>
+    <a:masterClrMapping/>
+  </p:clrMapOvr>
+</p:sld>
+</file>
+
+<file path=ppt/slides/slide5.xml><?xml version="1.0" encoding="utf-8"?>
 <p:sld xmlns:a="http://schemas.openxmlformats.org/drawingml/2006/main" xmlns:r="http://schemas.openxmlformats.org/officeDocument/2006/relationships" xmlns:p="http://schemas.openxmlformats.org/presentationml/2006/main">
   <p:cSld>
     <p:spTree>
@@ -23246,207 +23780,6 @@
     <p:extLst>
       <p:ext uri="{BB962C8B-B14F-4D97-AF65-F5344CB8AC3E}">
         <p14:creationId xmlns:p14="http://schemas.microsoft.com/office/powerpoint/2010/main" val="230693065"/>
-      </p:ext>
-    </p:extLst>
-  </p:cSld>
-  <p:clrMapOvr>
-    <a:masterClrMapping/>
-  </p:clrMapOvr>
-</p:sld>
-</file>
-
-<file path=ppt/slides/slide5.xml><?xml version="1.0" encoding="utf-8"?>
-<p:sld xmlns:a="http://schemas.openxmlformats.org/drawingml/2006/main" xmlns:r="http://schemas.openxmlformats.org/officeDocument/2006/relationships" xmlns:p="http://schemas.openxmlformats.org/presentationml/2006/main">
-  <p:cSld>
-    <p:spTree>
-      <p:nvGrpSpPr>
-        <p:cNvPr id="1" name=""/>
-        <p:cNvGrpSpPr/>
-        <p:nvPr/>
-      </p:nvGrpSpPr>
-      <p:grpSpPr>
-        <a:xfrm>
-          <a:off x="0" y="0"/>
-          <a:ext cx="0" cy="0"/>
-          <a:chOff x="0" y="0"/>
-          <a:chExt cx="0" cy="0"/>
-        </a:xfrm>
-      </p:grpSpPr>
-      <p:sp>
-        <p:nvSpPr>
-          <p:cNvPr id="2" name="Title 1">
-            <a:extLst>
-              <a:ext uri="{FF2B5EF4-FFF2-40B4-BE49-F238E27FC236}">
-                <a16:creationId xmlns:a16="http://schemas.microsoft.com/office/drawing/2014/main" id="{907E4F5B-BC68-A8DF-C49A-AF6F8F66DAC8}"/>
-              </a:ext>
-            </a:extLst>
-          </p:cNvPr>
-          <p:cNvSpPr>
-            <a:spLocks noGrp="1"/>
-          </p:cNvSpPr>
-          <p:nvPr>
-            <p:ph type="title"/>
-          </p:nvPr>
-        </p:nvSpPr>
-        <p:spPr/>
-        <p:txBody>
-          <a:bodyPr/>
-          <a:lstStyle/>
-          <a:p>
-            <a:r>
-              <a:rPr lang="en-AU" dirty="0"/>
-              <a:t>What we do</a:t>
-            </a:r>
-          </a:p>
-        </p:txBody>
-      </p:sp>
-      <p:sp>
-        <p:nvSpPr>
-          <p:cNvPr id="3" name="Content Placeholder 2">
-            <a:extLst>
-              <a:ext uri="{FF2B5EF4-FFF2-40B4-BE49-F238E27FC236}">
-                <a16:creationId xmlns:a16="http://schemas.microsoft.com/office/drawing/2014/main" id="{01762757-13E3-FEFE-AAD3-319A4256809D}"/>
-              </a:ext>
-            </a:extLst>
-          </p:cNvPr>
-          <p:cNvSpPr>
-            <a:spLocks noGrp="1"/>
-          </p:cNvSpPr>
-          <p:nvPr>
-            <p:ph sz="half" idx="1"/>
-          </p:nvPr>
-        </p:nvSpPr>
-        <p:spPr>
-          <a:xfrm>
-            <a:off x="313184" y="820589"/>
-            <a:ext cx="8521254" cy="3671640"/>
-          </a:xfrm>
-        </p:spPr>
-        <p:txBody>
-          <a:bodyPr>
-            <a:normAutofit fontScale="77500" lnSpcReduction="20000"/>
-          </a:bodyPr>
-          <a:lstStyle/>
-          <a:p>
-            <a:r>
-              <a:rPr lang="en-AU" dirty="0"/>
-              <a:t>We outline theoretical relationships between monetary and fiscal policies that may occur in the face of uncoordinated action using concepts from non-cooperative game theory.</a:t>
-            </a:r>
-            <a:br>
-              <a:rPr lang="en-AU" dirty="0"/>
-            </a:br>
-            <a:endParaRPr lang="en-AU" dirty="0"/>
-          </a:p>
-          <a:p>
-            <a:r>
-              <a:rPr lang="en-AU" dirty="0"/>
-              <a:t>We extend the current literature to include </a:t>
-            </a:r>
-          </a:p>
-          <a:p>
-            <a:pPr lvl="1"/>
-            <a:r>
-              <a:rPr lang="en-AU" dirty="0"/>
-              <a:t>dynamic strategic motives</a:t>
-            </a:r>
-          </a:p>
-          <a:p>
-            <a:pPr lvl="1"/>
-            <a:r>
-              <a:rPr lang="en-AU" dirty="0"/>
-              <a:t>The ability for policy makers to </a:t>
-            </a:r>
-            <a:r>
-              <a:rPr lang="en-AU" b="1" dirty="0"/>
-              <a:t>pre-commit</a:t>
-            </a:r>
-            <a:r>
-              <a:rPr lang="en-AU" dirty="0"/>
-              <a:t> in opposition to each other</a:t>
-            </a:r>
-          </a:p>
-          <a:p>
-            <a:pPr lvl="1"/>
-            <a:r>
-              <a:rPr lang="en-AU" dirty="0"/>
-              <a:t>The importance of </a:t>
-            </a:r>
-            <a:r>
-              <a:rPr lang="en-AU" b="1" dirty="0"/>
-              <a:t>adjustment costs</a:t>
-            </a:r>
-            <a:r>
-              <a:rPr lang="en-AU" dirty="0"/>
-              <a:t> and the choice of stickiness for generating these outcomes</a:t>
-            </a:r>
-          </a:p>
-          <a:p>
-            <a:pPr lvl="1"/>
-            <a:endParaRPr lang="en-AU" dirty="0"/>
-          </a:p>
-          <a:p>
-            <a:r>
-              <a:rPr lang="en-AU" dirty="0"/>
-              <a:t>We find that individual rationality by policy makers to independently pre-commit to courses of action may generate worse outcomes for both monetary and fiscal decision makers (</a:t>
-            </a:r>
-            <a:r>
-              <a:rPr lang="en-AU" u="sng" dirty="0"/>
-              <a:t>depending on the shock</a:t>
-            </a:r>
-            <a:r>
-              <a:rPr lang="en-AU" dirty="0"/>
-              <a:t>)</a:t>
-            </a:r>
-          </a:p>
-          <a:p>
-            <a:endParaRPr lang="en-AU" dirty="0"/>
-          </a:p>
-          <a:p>
-            <a:r>
-              <a:rPr lang="en-AU" dirty="0"/>
-              <a:t>While we possess an understanding of how these policies affect output and inflation, their effects on </a:t>
-            </a:r>
-            <a:r>
-              <a:rPr lang="en-AU" b="1" i="1" dirty="0"/>
-              <a:t>inequality</a:t>
-            </a:r>
-            <a:r>
-              <a:rPr lang="en-AU" dirty="0"/>
-              <a:t> remain less clear. Additionally, it is essential to investigate whether the government and the central bank prioritise</a:t>
-            </a:r>
-            <a:r>
-              <a:rPr lang="en-AU" b="1" i="1" dirty="0"/>
-              <a:t> inequality </a:t>
-            </a:r>
-            <a:r>
-              <a:rPr lang="en-AU" dirty="0"/>
-              <a:t>in their decision-making.</a:t>
-            </a:r>
-          </a:p>
-          <a:p>
-            <a:endParaRPr lang="en-AU" dirty="0"/>
-          </a:p>
-          <a:p>
-            <a:pPr marL="0" indent="0">
-              <a:buNone/>
-            </a:pPr>
-            <a:endParaRPr lang="en-AU" dirty="0"/>
-          </a:p>
-          <a:p>
-            <a:pPr marL="0" indent="0">
-              <a:buNone/>
-            </a:pPr>
-            <a:endParaRPr lang="en-AU" dirty="0"/>
-          </a:p>
-          <a:p>
-            <a:endParaRPr lang="en-AU" dirty="0"/>
-          </a:p>
-        </p:txBody>
-      </p:sp>
-    </p:spTree>
-    <p:extLst>
-      <p:ext uri="{BB962C8B-B14F-4D97-AF65-F5344CB8AC3E}">
-        <p14:creationId xmlns:p14="http://schemas.microsoft.com/office/powerpoint/2010/main" val="1406332539"/>
       </p:ext>
     </p:extLst>
   </p:cSld>
@@ -23478,6 +23811,207 @@
           <p:cNvPr id="2" name="Title 1">
             <a:extLst>
               <a:ext uri="{FF2B5EF4-FFF2-40B4-BE49-F238E27FC236}">
+                <a16:creationId xmlns:a16="http://schemas.microsoft.com/office/drawing/2014/main" id="{907E4F5B-BC68-A8DF-C49A-AF6F8F66DAC8}"/>
+              </a:ext>
+            </a:extLst>
+          </p:cNvPr>
+          <p:cNvSpPr>
+            <a:spLocks noGrp="1"/>
+          </p:cNvSpPr>
+          <p:nvPr>
+            <p:ph type="title"/>
+          </p:nvPr>
+        </p:nvSpPr>
+        <p:spPr/>
+        <p:txBody>
+          <a:bodyPr/>
+          <a:lstStyle/>
+          <a:p>
+            <a:r>
+              <a:rPr lang="en-AU" dirty="0"/>
+              <a:t>What we do</a:t>
+            </a:r>
+          </a:p>
+        </p:txBody>
+      </p:sp>
+      <p:sp>
+        <p:nvSpPr>
+          <p:cNvPr id="3" name="Content Placeholder 2">
+            <a:extLst>
+              <a:ext uri="{FF2B5EF4-FFF2-40B4-BE49-F238E27FC236}">
+                <a16:creationId xmlns:a16="http://schemas.microsoft.com/office/drawing/2014/main" id="{01762757-13E3-FEFE-AAD3-319A4256809D}"/>
+              </a:ext>
+            </a:extLst>
+          </p:cNvPr>
+          <p:cNvSpPr>
+            <a:spLocks noGrp="1"/>
+          </p:cNvSpPr>
+          <p:nvPr>
+            <p:ph sz="half" idx="1"/>
+          </p:nvPr>
+        </p:nvSpPr>
+        <p:spPr>
+          <a:xfrm>
+            <a:off x="313184" y="820589"/>
+            <a:ext cx="8521254" cy="3671640"/>
+          </a:xfrm>
+        </p:spPr>
+        <p:txBody>
+          <a:bodyPr>
+            <a:normAutofit fontScale="77500" lnSpcReduction="20000"/>
+          </a:bodyPr>
+          <a:lstStyle/>
+          <a:p>
+            <a:r>
+              <a:rPr lang="en-AU" dirty="0"/>
+              <a:t>We outline theoretical relationships between monetary and fiscal policies that may occur in the face of uncoordinated action using concepts from non-cooperative game theory.</a:t>
+            </a:r>
+            <a:br>
+              <a:rPr lang="en-AU" dirty="0"/>
+            </a:br>
+            <a:endParaRPr lang="en-AU" dirty="0"/>
+          </a:p>
+          <a:p>
+            <a:r>
+              <a:rPr lang="en-AU" dirty="0"/>
+              <a:t>We extend the current literature to include </a:t>
+            </a:r>
+          </a:p>
+          <a:p>
+            <a:pPr lvl="1"/>
+            <a:r>
+              <a:rPr lang="en-AU" dirty="0"/>
+              <a:t>dynamic strategic motives</a:t>
+            </a:r>
+          </a:p>
+          <a:p>
+            <a:pPr lvl="1"/>
+            <a:r>
+              <a:rPr lang="en-AU" dirty="0"/>
+              <a:t>The ability for policy makers to </a:t>
+            </a:r>
+            <a:r>
+              <a:rPr lang="en-AU" b="1" dirty="0"/>
+              <a:t>pre-commit</a:t>
+            </a:r>
+            <a:r>
+              <a:rPr lang="en-AU" dirty="0"/>
+              <a:t> in opposition to each other</a:t>
+            </a:r>
+          </a:p>
+          <a:p>
+            <a:pPr lvl="1"/>
+            <a:r>
+              <a:rPr lang="en-AU" dirty="0"/>
+              <a:t>The importance of </a:t>
+            </a:r>
+            <a:r>
+              <a:rPr lang="en-AU" b="1" dirty="0"/>
+              <a:t>adjustment costs</a:t>
+            </a:r>
+            <a:r>
+              <a:rPr lang="en-AU" dirty="0"/>
+              <a:t> and the choice of stickiness for generating these outcomes</a:t>
+            </a:r>
+          </a:p>
+          <a:p>
+            <a:pPr lvl="1"/>
+            <a:endParaRPr lang="en-AU" dirty="0"/>
+          </a:p>
+          <a:p>
+            <a:r>
+              <a:rPr lang="en-AU" dirty="0"/>
+              <a:t>We find that individual rationality by policy makers to independently pre-commit to courses of action may generate worse outcomes for both monetary and fiscal decision makers (</a:t>
+            </a:r>
+            <a:r>
+              <a:rPr lang="en-AU" u="sng" dirty="0"/>
+              <a:t>depending on the shock</a:t>
+            </a:r>
+            <a:r>
+              <a:rPr lang="en-AU" dirty="0"/>
+              <a:t>)</a:t>
+            </a:r>
+          </a:p>
+          <a:p>
+            <a:endParaRPr lang="en-AU" dirty="0"/>
+          </a:p>
+          <a:p>
+            <a:r>
+              <a:rPr lang="en-AU" dirty="0"/>
+              <a:t>While we possess an understanding of how these policies affect output and inflation, their effects on </a:t>
+            </a:r>
+            <a:r>
+              <a:rPr lang="en-AU" b="1" i="1" dirty="0"/>
+              <a:t>inequality</a:t>
+            </a:r>
+            <a:r>
+              <a:rPr lang="en-AU" dirty="0"/>
+              <a:t> remain less clear. Additionally, it is essential to investigate whether the government and the central bank prioritise</a:t>
+            </a:r>
+            <a:r>
+              <a:rPr lang="en-AU" b="1" i="1" dirty="0"/>
+              <a:t> inequality </a:t>
+            </a:r>
+            <a:r>
+              <a:rPr lang="en-AU" dirty="0"/>
+              <a:t>in their decision-making.</a:t>
+            </a:r>
+          </a:p>
+          <a:p>
+            <a:endParaRPr lang="en-AU" dirty="0"/>
+          </a:p>
+          <a:p>
+            <a:pPr marL="0" indent="0">
+              <a:buNone/>
+            </a:pPr>
+            <a:endParaRPr lang="en-AU" dirty="0"/>
+          </a:p>
+          <a:p>
+            <a:pPr marL="0" indent="0">
+              <a:buNone/>
+            </a:pPr>
+            <a:endParaRPr lang="en-AU" dirty="0"/>
+          </a:p>
+          <a:p>
+            <a:endParaRPr lang="en-AU" dirty="0"/>
+          </a:p>
+        </p:txBody>
+      </p:sp>
+    </p:spTree>
+    <p:extLst>
+      <p:ext uri="{BB962C8B-B14F-4D97-AF65-F5344CB8AC3E}">
+        <p14:creationId xmlns:p14="http://schemas.microsoft.com/office/powerpoint/2010/main" val="1406332539"/>
+      </p:ext>
+    </p:extLst>
+  </p:cSld>
+  <p:clrMapOvr>
+    <a:masterClrMapping/>
+  </p:clrMapOvr>
+</p:sld>
+</file>
+
+<file path=ppt/slides/slide7.xml><?xml version="1.0" encoding="utf-8"?>
+<p:sld xmlns:a="http://schemas.openxmlformats.org/drawingml/2006/main" xmlns:r="http://schemas.openxmlformats.org/officeDocument/2006/relationships" xmlns:p="http://schemas.openxmlformats.org/presentationml/2006/main">
+  <p:cSld>
+    <p:spTree>
+      <p:nvGrpSpPr>
+        <p:cNvPr id="1" name=""/>
+        <p:cNvGrpSpPr/>
+        <p:nvPr/>
+      </p:nvGrpSpPr>
+      <p:grpSpPr>
+        <a:xfrm>
+          <a:off x="0" y="0"/>
+          <a:ext cx="0" cy="0"/>
+          <a:chOff x="0" y="0"/>
+          <a:chExt cx="0" cy="0"/>
+        </a:xfrm>
+      </p:grpSpPr>
+      <p:sp>
+        <p:nvSpPr>
+          <p:cNvPr id="2" name="Title 1">
+            <a:extLst>
+              <a:ext uri="{FF2B5EF4-FFF2-40B4-BE49-F238E27FC236}">
                 <a16:creationId xmlns:a16="http://schemas.microsoft.com/office/drawing/2014/main" id="{746158E1-EF5B-8FFB-1066-6D154DC9BDE5}"/>
               </a:ext>
             </a:extLst>
@@ -23626,7 +24160,7 @@
 </p:sld>
 </file>
 
-<file path=ppt/slides/slide7.xml><?xml version="1.0" encoding="utf-8"?>
+<file path=ppt/slides/slide8.xml><?xml version="1.0" encoding="utf-8"?>
 <p:sld xmlns:a="http://schemas.openxmlformats.org/drawingml/2006/main" xmlns:r="http://schemas.openxmlformats.org/officeDocument/2006/relationships" xmlns:p="http://schemas.openxmlformats.org/presentationml/2006/main">
   <p:cSld>
     <p:spTree>
@@ -23728,7 +24262,7 @@
 </p:sld>
 </file>
 
-<file path=ppt/slides/slide8.xml><?xml version="1.0" encoding="utf-8"?>
+<file path=ppt/slides/slide9.xml><?xml version="1.0" encoding="utf-8"?>
 <p:sld xmlns:a="http://schemas.openxmlformats.org/drawingml/2006/main" xmlns:r="http://schemas.openxmlformats.org/officeDocument/2006/relationships" xmlns:p="http://schemas.openxmlformats.org/presentationml/2006/main">
   <p:cSld>
     <p:spTree>
@@ -23909,152 +24443,6 @@
     <p:extLst>
       <p:ext uri="{BB962C8B-B14F-4D97-AF65-F5344CB8AC3E}">
         <p14:creationId xmlns:p14="http://schemas.microsoft.com/office/powerpoint/2010/main" val="3552764780"/>
-      </p:ext>
-    </p:extLst>
-  </p:cSld>
-  <p:clrMapOvr>
-    <a:masterClrMapping/>
-  </p:clrMapOvr>
-</p:sld>
-</file>
-
-<file path=ppt/slides/slide9.xml><?xml version="1.0" encoding="utf-8"?>
-<p:sld xmlns:a="http://schemas.openxmlformats.org/drawingml/2006/main" xmlns:r="http://schemas.openxmlformats.org/officeDocument/2006/relationships" xmlns:p="http://schemas.openxmlformats.org/presentationml/2006/main">
-  <p:cSld>
-    <p:spTree>
-      <p:nvGrpSpPr>
-        <p:cNvPr id="1" name="">
-          <a:extLst>
-            <a:ext uri="{FF2B5EF4-FFF2-40B4-BE49-F238E27FC236}">
-              <a16:creationId xmlns:a16="http://schemas.microsoft.com/office/drawing/2014/main" id="{731DA61C-EB86-E9DA-0BE9-7D651B82E42C}"/>
-            </a:ext>
-          </a:extLst>
-        </p:cNvPr>
-        <p:cNvGrpSpPr/>
-        <p:nvPr/>
-      </p:nvGrpSpPr>
-      <p:grpSpPr>
-        <a:xfrm>
-          <a:off x="0" y="0"/>
-          <a:ext cx="0" cy="0"/>
-          <a:chOff x="0" y="0"/>
-          <a:chExt cx="0" cy="0"/>
-        </a:xfrm>
-      </p:grpSpPr>
-      <p:sp>
-        <p:nvSpPr>
-          <p:cNvPr id="2" name="Title 1">
-            <a:extLst>
-              <a:ext uri="{FF2B5EF4-FFF2-40B4-BE49-F238E27FC236}">
-                <a16:creationId xmlns:a16="http://schemas.microsoft.com/office/drawing/2014/main" id="{55C82006-C035-E4A8-BFF2-179007CFBE49}"/>
-              </a:ext>
-            </a:extLst>
-          </p:cNvPr>
-          <p:cNvSpPr>
-            <a:spLocks noGrp="1"/>
-          </p:cNvSpPr>
-          <p:nvPr>
-            <p:ph type="title"/>
-          </p:nvPr>
-        </p:nvSpPr>
-        <p:spPr/>
-        <p:txBody>
-          <a:bodyPr/>
-          <a:lstStyle/>
-          <a:p>
-            <a:r>
-              <a:rPr lang="en-AU" dirty="0"/>
-              <a:t>Key pieces</a:t>
-            </a:r>
-          </a:p>
-        </p:txBody>
-      </p:sp>
-      <p:sp>
-        <p:nvSpPr>
-          <p:cNvPr id="3" name="Content Placeholder 2">
-            <a:extLst>
-              <a:ext uri="{FF2B5EF4-FFF2-40B4-BE49-F238E27FC236}">
-                <a16:creationId xmlns:a16="http://schemas.microsoft.com/office/drawing/2014/main" id="{7F6F0124-6AB2-AD3C-994C-184C7536A033}"/>
-              </a:ext>
-            </a:extLst>
-          </p:cNvPr>
-          <p:cNvSpPr>
-            <a:spLocks noGrp="1"/>
-          </p:cNvSpPr>
-          <p:nvPr>
-            <p:ph sz="half" idx="1"/>
-          </p:nvPr>
-        </p:nvSpPr>
-        <p:spPr>
-          <a:xfrm>
-            <a:off x="390364" y="771550"/>
-            <a:ext cx="8363272" cy="4104456"/>
-          </a:xfrm>
-        </p:spPr>
-        <p:txBody>
-          <a:bodyPr>
-            <a:normAutofit/>
-          </a:bodyPr>
-          <a:lstStyle/>
-          <a:p>
-            <a:pPr marL="0" indent="0">
-              <a:buNone/>
-            </a:pPr>
-            <a:r>
-              <a:rPr lang="en-AU" dirty="0"/>
-              <a:t>Adjustment costs of changing policy instruments.</a:t>
-            </a:r>
-          </a:p>
-          <a:p>
-            <a:r>
-              <a:rPr lang="en-AU" dirty="0"/>
-              <a:t>XXX</a:t>
-            </a:r>
-          </a:p>
-          <a:p>
-            <a:r>
-              <a:rPr lang="en-AU" dirty="0"/>
-              <a:t>XXX</a:t>
-            </a:r>
-          </a:p>
-          <a:p>
-            <a:endParaRPr lang="en-AU" dirty="0"/>
-          </a:p>
-          <a:p>
-            <a:endParaRPr lang="en-AU" dirty="0"/>
-          </a:p>
-          <a:p>
-            <a:endParaRPr lang="en-AU" dirty="0"/>
-          </a:p>
-          <a:p>
-            <a:pPr marL="0" indent="0">
-              <a:buNone/>
-            </a:pPr>
-            <a:r>
-              <a:rPr lang="en-AU" dirty="0"/>
-              <a:t>Dynamic oligopoly models and </a:t>
-            </a:r>
-            <a:r>
-              <a:rPr lang="en-AU" dirty="0" err="1"/>
-              <a:t>supermodularity</a:t>
-            </a:r>
-            <a:r>
-              <a:rPr lang="en-AU" dirty="0"/>
-              <a:t>.</a:t>
-            </a:r>
-          </a:p>
-          <a:p>
-            <a:r>
-              <a:rPr lang="en-US" dirty="0"/>
-              <a:t>XXX</a:t>
-            </a:r>
-          </a:p>
-        </p:txBody>
-      </p:sp>
-    </p:spTree>
-    <p:extLst>
-      <p:ext uri="{BB962C8B-B14F-4D97-AF65-F5344CB8AC3E}">
-        <p14:creationId xmlns:p14="http://schemas.microsoft.com/office/powerpoint/2010/main" val="3486791445"/>
       </p:ext>
     </p:extLst>
   </p:cSld>

</xml_diff>